<commit_message>
updating powerpoint with distro graph
</commit_message>
<xml_diff>
--- a/docs/deliverables/final/tracking_analysis_deliverable.pptx
+++ b/docs/deliverables/final/tracking_analysis_deliverable.pptx
@@ -3972,8 +3972,8 @@
           <p:nvPr/>
         </p:nvGraphicFramePr>
         <p:xfrm>
-          <a:off x="5029200" y="4389120"/>
-          <a:ext cx="3200400" cy="1645920"/>
+          <a:off x="5029200" y="4114800"/>
+          <a:ext cx="3200400" cy="2103120"/>
         </p:xfrm>
         <a:graphic>
           <a:graphicData uri="http://schemas.openxmlformats.org/drawingml/2006/table">
@@ -3985,7 +3985,7 @@
                 <a:gridCol w="1600200"/>
                 <a:gridCol w="1600200"/>
               </a:tblGrid>
-              <a:tr h="329184">
+              <a:tr h="300445">
                 <a:tc>
                   <a:txBody>
                     <a:bodyPr/>
@@ -4010,14 +4010,14 @@
                         <a:defRPr b="1" sz="1000"/>
                       </a:pPr>
                       <a:r>
-                        <a:t>Count</a:t>
+                        <a:t>Value</a:t>
                       </a:r>
                     </a:p>
                   </a:txBody>
                   <a:tcPr/>
                 </a:tc>
               </a:tr>
-              <a:tr h="329184">
+              <a:tr h="300445">
                 <a:tc>
                   <a:txBody>
                     <a:bodyPr/>
@@ -4049,7 +4049,7 @@
                   <a:tcPr/>
                 </a:tc>
               </a:tr>
-              <a:tr h="329184">
+              <a:tr h="300445">
                 <a:tc>
                   <a:txBody>
                     <a:bodyPr/>
@@ -4081,7 +4081,7 @@
                   <a:tcPr/>
                 </a:tc>
               </a:tr>
-              <a:tr h="329184">
+              <a:tr h="300445">
                 <a:tc>
                   <a:txBody>
                     <a:bodyPr/>
@@ -4113,7 +4113,7 @@
                   <a:tcPr/>
                 </a:tc>
               </a:tr>
-              <a:tr h="329184">
+              <a:tr h="300445">
                 <a:tc>
                   <a:txBody>
                     <a:bodyPr/>
@@ -4139,6 +4139,70 @@
                       </a:pPr>
                       <a:r>
                         <a:t>2.0</a:t>
+                      </a:r>
+                    </a:p>
+                  </a:txBody>
+                  <a:tcPr/>
+                </a:tc>
+              </a:tr>
+              <a:tr h="300445">
+                <a:tc>
+                  <a:txBody>
+                    <a:bodyPr/>
+                    <a:lstStyle/>
+                    <a:p>
+                      <a:pPr>
+                        <a:defRPr sz="900"/>
+                      </a:pPr>
+                      <a:r>
+                        <a:t>Peak Accel</a:t>
+                      </a:r>
+                    </a:p>
+                  </a:txBody>
+                  <a:tcPr/>
+                </a:tc>
+                <a:tc>
+                  <a:txBody>
+                    <a:bodyPr/>
+                    <a:lstStyle/>
+                    <a:p>
+                      <a:pPr>
+                        <a:defRPr sz="900"/>
+                      </a:pPr>
+                      <a:r>
+                        <a:t>4.93 m/s²</a:t>
+                      </a:r>
+                    </a:p>
+                  </a:txBody>
+                  <a:tcPr/>
+                </a:tc>
+              </a:tr>
+              <a:tr h="300450">
+                <a:tc>
+                  <a:txBody>
+                    <a:bodyPr/>
+                    <a:lstStyle/>
+                    <a:p>
+                      <a:pPr>
+                        <a:defRPr sz="900"/>
+                      </a:pPr>
+                      <a:r>
+                        <a:t>Peak Decel</a:t>
+                      </a:r>
+                    </a:p>
+                  </a:txBody>
+                  <a:tcPr/>
+                </a:tc>
+                <a:tc>
+                  <a:txBody>
+                    <a:bodyPr/>
+                    <a:lstStyle/>
+                    <a:p>
+                      <a:pPr>
+                        <a:defRPr sz="900"/>
+                      </a:pPr>
+                      <a:r>
+                        <a:t>-5.12 m/s²</a:t>
                       </a:r>
                     </a:p>
                   </a:txBody>

</xml_diff>

<commit_message>
updating with updated powerpoint
</commit_message>
<xml_diff>
--- a/docs/deliverables/final/tracking_analysis_deliverable.pptx
+++ b/docs/deliverables/final/tracking_analysis_deliverable.pptx
@@ -5,13 +5,13 @@
     <p:sldMasterId id="2147483648" r:id="rId1"/>
   </p:sldMasterIdLst>
   <p:sldIdLst>
-    <p:sldId id="256" r:id="rId7"/>
-    <p:sldId id="257" r:id="rId8"/>
-    <p:sldId id="258" r:id="rId9"/>
-    <p:sldId id="259" r:id="rId10"/>
-    <p:sldId id="260" r:id="rId11"/>
-    <p:sldId id="261" r:id="rId12"/>
-    <p:sldId id="262" r:id="rId13"/>
+    <p:sldId id="256" r:id="rId2"/>
+    <p:sldId id="257" r:id="rId3"/>
+    <p:sldId id="258" r:id="rId4"/>
+    <p:sldId id="259" r:id="rId5"/>
+    <p:sldId id="260" r:id="rId6"/>
+    <p:sldId id="261" r:id="rId7"/>
+    <p:sldId id="262" r:id="rId8"/>
   </p:sldIdLst>
   <p:sldSz cx="9144000" cy="6858000" type="screen4x3"/>
   <p:notesSz cx="6858000" cy="9144000"/>
@@ -110,6 +110,22 @@
       </a:defRPr>
     </a:lvl9pPr>
   </p:defaultTextStyle>
+  <p:extLst>
+    <p:ext uri="{EFAFB233-063F-42B5-8137-9DF3F51BA10A}">
+      <p15:sldGuideLst xmlns:p15="http://schemas.microsoft.com/office/powerpoint/2012/main">
+        <p15:guide id="1" orient="horz" pos="2160">
+          <p15:clr>
+            <a:srgbClr val="A4A3A4"/>
+          </p15:clr>
+        </p15:guide>
+        <p15:guide id="2" pos="2880">
+          <p15:clr>
+            <a:srgbClr val="A4A3A4"/>
+          </p15:clr>
+        </p15:guide>
+      </p15:sldGuideLst>
+    </p:ext>
+  </p:extLst>
 </p:presentation>
 </file>
 
@@ -151,10 +167,9 @@
           <a:lstStyle/>
           <a:p>
             <a:r>
-              <a:rPr lang="en-US" smtClean="0"/>
+              <a:rPr lang="en-US"/>
               <a:t>Click to edit Master title style</a:t>
             </a:r>
-            <a:endParaRPr lang="en-US"/>
           </a:p>
         </p:txBody>
       </p:sp>
@@ -270,10 +285,9 @@
           </a:lstStyle>
           <a:p>
             <a:r>
-              <a:rPr lang="en-US" smtClean="0"/>
+              <a:rPr lang="en-US"/>
               <a:t>Click to edit Master subtitle style</a:t>
             </a:r>
-            <a:endParaRPr lang="en-US"/>
           </a:p>
         </p:txBody>
       </p:sp>
@@ -294,7 +308,7 @@
           <a:p>
             <a:fld id="{5BCAD085-E8A6-8845-BD4E-CB4CCA059FC4}" type="datetimeFigureOut">
               <a:rPr lang="en-US" smtClean="0"/>
-              <a:t>1/27/13</a:t>
+              <a:t>2/12/2026</a:t>
             </a:fld>
             <a:endParaRPr lang="en-US"/>
           </a:p>
@@ -388,10 +402,9 @@
           <a:lstStyle/>
           <a:p>
             <a:r>
-              <a:rPr lang="en-US" smtClean="0"/>
+              <a:rPr lang="en-US"/>
               <a:t>Click to edit Master title style</a:t>
             </a:r>
-            <a:endParaRPr lang="en-US"/>
           </a:p>
         </p:txBody>
       </p:sp>
@@ -412,38 +425,37 @@
           <a:p>
             <a:pPr lvl="0"/>
             <a:r>
-              <a:rPr lang="en-US" smtClean="0"/>
+              <a:rPr lang="en-US"/>
               <a:t>Click to edit Master text styles</a:t>
             </a:r>
           </a:p>
           <a:p>
             <a:pPr lvl="1"/>
             <a:r>
-              <a:rPr lang="en-US" smtClean="0"/>
+              <a:rPr lang="en-US"/>
               <a:t>Second level</a:t>
             </a:r>
           </a:p>
           <a:p>
             <a:pPr lvl="2"/>
             <a:r>
-              <a:rPr lang="en-US" smtClean="0"/>
+              <a:rPr lang="en-US"/>
               <a:t>Third level</a:t>
             </a:r>
           </a:p>
           <a:p>
             <a:pPr lvl="3"/>
             <a:r>
-              <a:rPr lang="en-US" smtClean="0"/>
+              <a:rPr lang="en-US"/>
               <a:t>Fourth level</a:t>
             </a:r>
           </a:p>
           <a:p>
             <a:pPr lvl="4"/>
             <a:r>
-              <a:rPr lang="en-US" smtClean="0"/>
+              <a:rPr lang="en-US"/>
               <a:t>Fifth level</a:t>
             </a:r>
-            <a:endParaRPr lang="en-US"/>
           </a:p>
         </p:txBody>
       </p:sp>
@@ -464,7 +476,7 @@
           <a:p>
             <a:fld id="{5BCAD085-E8A6-8845-BD4E-CB4CCA059FC4}" type="datetimeFigureOut">
               <a:rPr lang="en-US" smtClean="0"/>
-              <a:t>1/27/13</a:t>
+              <a:t>2/12/2026</a:t>
             </a:fld>
             <a:endParaRPr lang="en-US"/>
           </a:p>
@@ -563,10 +575,9 @@
           <a:lstStyle/>
           <a:p>
             <a:r>
-              <a:rPr lang="en-US" smtClean="0"/>
+              <a:rPr lang="en-US"/>
               <a:t>Click to edit Master title style</a:t>
             </a:r>
-            <a:endParaRPr lang="en-US"/>
           </a:p>
         </p:txBody>
       </p:sp>
@@ -592,38 +603,37 @@
           <a:p>
             <a:pPr lvl="0"/>
             <a:r>
-              <a:rPr lang="en-US" smtClean="0"/>
+              <a:rPr lang="en-US"/>
               <a:t>Click to edit Master text styles</a:t>
             </a:r>
           </a:p>
           <a:p>
             <a:pPr lvl="1"/>
             <a:r>
-              <a:rPr lang="en-US" smtClean="0"/>
+              <a:rPr lang="en-US"/>
               <a:t>Second level</a:t>
             </a:r>
           </a:p>
           <a:p>
             <a:pPr lvl="2"/>
             <a:r>
-              <a:rPr lang="en-US" smtClean="0"/>
+              <a:rPr lang="en-US"/>
               <a:t>Third level</a:t>
             </a:r>
           </a:p>
           <a:p>
             <a:pPr lvl="3"/>
             <a:r>
-              <a:rPr lang="en-US" smtClean="0"/>
+              <a:rPr lang="en-US"/>
               <a:t>Fourth level</a:t>
             </a:r>
           </a:p>
           <a:p>
             <a:pPr lvl="4"/>
             <a:r>
-              <a:rPr lang="en-US" smtClean="0"/>
+              <a:rPr lang="en-US"/>
               <a:t>Fifth level</a:t>
             </a:r>
-            <a:endParaRPr lang="en-US"/>
           </a:p>
         </p:txBody>
       </p:sp>
@@ -644,7 +654,7 @@
           <a:p>
             <a:fld id="{5BCAD085-E8A6-8845-BD4E-CB4CCA059FC4}" type="datetimeFigureOut">
               <a:rPr lang="en-US" smtClean="0"/>
-              <a:t>1/27/13</a:t>
+              <a:t>2/12/2026</a:t>
             </a:fld>
             <a:endParaRPr lang="en-US"/>
           </a:p>
@@ -738,10 +748,9 @@
           <a:lstStyle/>
           <a:p>
             <a:r>
-              <a:rPr lang="en-US" smtClean="0"/>
+              <a:rPr lang="en-US"/>
               <a:t>Click to edit Master title style</a:t>
             </a:r>
-            <a:endParaRPr lang="en-US"/>
           </a:p>
         </p:txBody>
       </p:sp>
@@ -762,38 +771,37 @@
           <a:p>
             <a:pPr lvl="0"/>
             <a:r>
-              <a:rPr lang="en-US" smtClean="0"/>
+              <a:rPr lang="en-US"/>
               <a:t>Click to edit Master text styles</a:t>
             </a:r>
           </a:p>
           <a:p>
             <a:pPr lvl="1"/>
             <a:r>
-              <a:rPr lang="en-US" smtClean="0"/>
+              <a:rPr lang="en-US"/>
               <a:t>Second level</a:t>
             </a:r>
           </a:p>
           <a:p>
             <a:pPr lvl="2"/>
             <a:r>
-              <a:rPr lang="en-US" smtClean="0"/>
+              <a:rPr lang="en-US"/>
               <a:t>Third level</a:t>
             </a:r>
           </a:p>
           <a:p>
             <a:pPr lvl="3"/>
             <a:r>
-              <a:rPr lang="en-US" smtClean="0"/>
+              <a:rPr lang="en-US"/>
               <a:t>Fourth level</a:t>
             </a:r>
           </a:p>
           <a:p>
             <a:pPr lvl="4"/>
             <a:r>
-              <a:rPr lang="en-US" smtClean="0"/>
+              <a:rPr lang="en-US"/>
               <a:t>Fifth level</a:t>
             </a:r>
-            <a:endParaRPr lang="en-US"/>
           </a:p>
         </p:txBody>
       </p:sp>
@@ -814,7 +822,7 @@
           <a:p>
             <a:fld id="{5BCAD085-E8A6-8845-BD4E-CB4CCA059FC4}" type="datetimeFigureOut">
               <a:rPr lang="en-US" smtClean="0"/>
-              <a:t>1/27/13</a:t>
+              <a:t>2/12/2026</a:t>
             </a:fld>
             <a:endParaRPr lang="en-US"/>
           </a:p>
@@ -917,10 +925,9 @@
           </a:lstStyle>
           <a:p>
             <a:r>
-              <a:rPr lang="en-US" smtClean="0"/>
+              <a:rPr lang="en-US"/>
               <a:t>Click to edit Master title style</a:t>
             </a:r>
-            <a:endParaRPr lang="en-US"/>
           </a:p>
         </p:txBody>
       </p:sp>
@@ -1037,7 +1044,7 @@
           <a:p>
             <a:pPr lvl="0"/>
             <a:r>
-              <a:rPr lang="en-US" smtClean="0"/>
+              <a:rPr lang="en-US"/>
               <a:t>Click to edit Master text styles</a:t>
             </a:r>
           </a:p>
@@ -1060,7 +1067,7 @@
           <a:p>
             <a:fld id="{5BCAD085-E8A6-8845-BD4E-CB4CCA059FC4}" type="datetimeFigureOut">
               <a:rPr lang="en-US" smtClean="0"/>
-              <a:t>1/27/13</a:t>
+              <a:t>2/12/2026</a:t>
             </a:fld>
             <a:endParaRPr lang="en-US"/>
           </a:p>
@@ -1154,10 +1161,9 @@
           <a:lstStyle/>
           <a:p>
             <a:r>
-              <a:rPr lang="en-US" smtClean="0"/>
+              <a:rPr lang="en-US"/>
               <a:t>Click to edit Master title style</a:t>
             </a:r>
-            <a:endParaRPr lang="en-US"/>
           </a:p>
         </p:txBody>
       </p:sp>
@@ -1211,38 +1217,37 @@
           <a:p>
             <a:pPr lvl="0"/>
             <a:r>
-              <a:rPr lang="en-US" smtClean="0"/>
+              <a:rPr lang="en-US"/>
               <a:t>Click to edit Master text styles</a:t>
             </a:r>
           </a:p>
           <a:p>
             <a:pPr lvl="1"/>
             <a:r>
-              <a:rPr lang="en-US" smtClean="0"/>
+              <a:rPr lang="en-US"/>
               <a:t>Second level</a:t>
             </a:r>
           </a:p>
           <a:p>
             <a:pPr lvl="2"/>
             <a:r>
-              <a:rPr lang="en-US" smtClean="0"/>
+              <a:rPr lang="en-US"/>
               <a:t>Third level</a:t>
             </a:r>
           </a:p>
           <a:p>
             <a:pPr lvl="3"/>
             <a:r>
-              <a:rPr lang="en-US" smtClean="0"/>
+              <a:rPr lang="en-US"/>
               <a:t>Fourth level</a:t>
             </a:r>
           </a:p>
           <a:p>
             <a:pPr lvl="4"/>
             <a:r>
-              <a:rPr lang="en-US" smtClean="0"/>
+              <a:rPr lang="en-US"/>
               <a:t>Fifth level</a:t>
             </a:r>
-            <a:endParaRPr lang="en-US"/>
           </a:p>
         </p:txBody>
       </p:sp>
@@ -1296,38 +1301,37 @@
           <a:p>
             <a:pPr lvl="0"/>
             <a:r>
-              <a:rPr lang="en-US" smtClean="0"/>
+              <a:rPr lang="en-US"/>
               <a:t>Click to edit Master text styles</a:t>
             </a:r>
           </a:p>
           <a:p>
             <a:pPr lvl="1"/>
             <a:r>
-              <a:rPr lang="en-US" smtClean="0"/>
+              <a:rPr lang="en-US"/>
               <a:t>Second level</a:t>
             </a:r>
           </a:p>
           <a:p>
             <a:pPr lvl="2"/>
             <a:r>
-              <a:rPr lang="en-US" smtClean="0"/>
+              <a:rPr lang="en-US"/>
               <a:t>Third level</a:t>
             </a:r>
           </a:p>
           <a:p>
             <a:pPr lvl="3"/>
             <a:r>
-              <a:rPr lang="en-US" smtClean="0"/>
+              <a:rPr lang="en-US"/>
               <a:t>Fourth level</a:t>
             </a:r>
           </a:p>
           <a:p>
             <a:pPr lvl="4"/>
             <a:r>
-              <a:rPr lang="en-US" smtClean="0"/>
+              <a:rPr lang="en-US"/>
               <a:t>Fifth level</a:t>
             </a:r>
-            <a:endParaRPr lang="en-US"/>
           </a:p>
         </p:txBody>
       </p:sp>
@@ -1348,7 +1352,7 @@
           <a:p>
             <a:fld id="{5BCAD085-E8A6-8845-BD4E-CB4CCA059FC4}" type="datetimeFigureOut">
               <a:rPr lang="en-US" smtClean="0"/>
-              <a:t>1/27/13</a:t>
+              <a:t>2/12/2026</a:t>
             </a:fld>
             <a:endParaRPr lang="en-US"/>
           </a:p>
@@ -1446,10 +1450,9 @@
           </a:lstStyle>
           <a:p>
             <a:r>
-              <a:rPr lang="en-US" smtClean="0"/>
+              <a:rPr lang="en-US"/>
               <a:t>Click to edit Master title style</a:t>
             </a:r>
-            <a:endParaRPr lang="en-US"/>
           </a:p>
         </p:txBody>
       </p:sp>
@@ -1512,7 +1515,7 @@
           <a:p>
             <a:pPr lvl="0"/>
             <a:r>
-              <a:rPr lang="en-US" smtClean="0"/>
+              <a:rPr lang="en-US"/>
               <a:t>Click to edit Master text styles</a:t>
             </a:r>
           </a:p>
@@ -1568,38 +1571,37 @@
           <a:p>
             <a:pPr lvl="0"/>
             <a:r>
-              <a:rPr lang="en-US" smtClean="0"/>
+              <a:rPr lang="en-US"/>
               <a:t>Click to edit Master text styles</a:t>
             </a:r>
           </a:p>
           <a:p>
             <a:pPr lvl="1"/>
             <a:r>
-              <a:rPr lang="en-US" smtClean="0"/>
+              <a:rPr lang="en-US"/>
               <a:t>Second level</a:t>
             </a:r>
           </a:p>
           <a:p>
             <a:pPr lvl="2"/>
             <a:r>
-              <a:rPr lang="en-US" smtClean="0"/>
+              <a:rPr lang="en-US"/>
               <a:t>Third level</a:t>
             </a:r>
           </a:p>
           <a:p>
             <a:pPr lvl="3"/>
             <a:r>
-              <a:rPr lang="en-US" smtClean="0"/>
+              <a:rPr lang="en-US"/>
               <a:t>Fourth level</a:t>
             </a:r>
           </a:p>
           <a:p>
             <a:pPr lvl="4"/>
             <a:r>
-              <a:rPr lang="en-US" smtClean="0"/>
+              <a:rPr lang="en-US"/>
               <a:t>Fifth level</a:t>
             </a:r>
-            <a:endParaRPr lang="en-US"/>
           </a:p>
         </p:txBody>
       </p:sp>
@@ -1662,7 +1664,7 @@
           <a:p>
             <a:pPr lvl="0"/>
             <a:r>
-              <a:rPr lang="en-US" smtClean="0"/>
+              <a:rPr lang="en-US"/>
               <a:t>Click to edit Master text styles</a:t>
             </a:r>
           </a:p>
@@ -1718,38 +1720,37 @@
           <a:p>
             <a:pPr lvl="0"/>
             <a:r>
-              <a:rPr lang="en-US" smtClean="0"/>
+              <a:rPr lang="en-US"/>
               <a:t>Click to edit Master text styles</a:t>
             </a:r>
           </a:p>
           <a:p>
             <a:pPr lvl="1"/>
             <a:r>
-              <a:rPr lang="en-US" smtClean="0"/>
+              <a:rPr lang="en-US"/>
               <a:t>Second level</a:t>
             </a:r>
           </a:p>
           <a:p>
             <a:pPr lvl="2"/>
             <a:r>
-              <a:rPr lang="en-US" smtClean="0"/>
+              <a:rPr lang="en-US"/>
               <a:t>Third level</a:t>
             </a:r>
           </a:p>
           <a:p>
             <a:pPr lvl="3"/>
             <a:r>
-              <a:rPr lang="en-US" smtClean="0"/>
+              <a:rPr lang="en-US"/>
               <a:t>Fourth level</a:t>
             </a:r>
           </a:p>
           <a:p>
             <a:pPr lvl="4"/>
             <a:r>
-              <a:rPr lang="en-US" smtClean="0"/>
+              <a:rPr lang="en-US"/>
               <a:t>Fifth level</a:t>
             </a:r>
-            <a:endParaRPr lang="en-US"/>
           </a:p>
         </p:txBody>
       </p:sp>
@@ -1770,7 +1771,7 @@
           <a:p>
             <a:fld id="{5BCAD085-E8A6-8845-BD4E-CB4CCA059FC4}" type="datetimeFigureOut">
               <a:rPr lang="en-US" smtClean="0"/>
-              <a:t>1/27/13</a:t>
+              <a:t>2/12/2026</a:t>
             </a:fld>
             <a:endParaRPr lang="en-US"/>
           </a:p>
@@ -1864,10 +1865,9 @@
           <a:lstStyle/>
           <a:p>
             <a:r>
-              <a:rPr lang="en-US" smtClean="0"/>
+              <a:rPr lang="en-US"/>
               <a:t>Click to edit Master title style</a:t>
             </a:r>
-            <a:endParaRPr lang="en-US"/>
           </a:p>
         </p:txBody>
       </p:sp>
@@ -1888,7 +1888,7 @@
           <a:p>
             <a:fld id="{5BCAD085-E8A6-8845-BD4E-CB4CCA059FC4}" type="datetimeFigureOut">
               <a:rPr lang="en-US" smtClean="0"/>
-              <a:t>1/27/13</a:t>
+              <a:t>2/12/2026</a:t>
             </a:fld>
             <a:endParaRPr lang="en-US"/>
           </a:p>
@@ -1983,7 +1983,7 @@
           <a:p>
             <a:fld id="{5BCAD085-E8A6-8845-BD4E-CB4CCA059FC4}" type="datetimeFigureOut">
               <a:rPr lang="en-US" smtClean="0"/>
-              <a:t>1/27/13</a:t>
+              <a:t>2/12/2026</a:t>
             </a:fld>
             <a:endParaRPr lang="en-US"/>
           </a:p>
@@ -2086,10 +2086,9 @@
           </a:lstStyle>
           <a:p>
             <a:r>
-              <a:rPr lang="en-US" smtClean="0"/>
+              <a:rPr lang="en-US"/>
               <a:t>Click to edit Master title style</a:t>
             </a:r>
-            <a:endParaRPr lang="en-US"/>
           </a:p>
         </p:txBody>
       </p:sp>
@@ -2143,38 +2142,37 @@
           <a:p>
             <a:pPr lvl="0"/>
             <a:r>
-              <a:rPr lang="en-US" smtClean="0"/>
+              <a:rPr lang="en-US"/>
               <a:t>Click to edit Master text styles</a:t>
             </a:r>
           </a:p>
           <a:p>
             <a:pPr lvl="1"/>
             <a:r>
-              <a:rPr lang="en-US" smtClean="0"/>
+              <a:rPr lang="en-US"/>
               <a:t>Second level</a:t>
             </a:r>
           </a:p>
           <a:p>
             <a:pPr lvl="2"/>
             <a:r>
-              <a:rPr lang="en-US" smtClean="0"/>
+              <a:rPr lang="en-US"/>
               <a:t>Third level</a:t>
             </a:r>
           </a:p>
           <a:p>
             <a:pPr lvl="3"/>
             <a:r>
-              <a:rPr lang="en-US" smtClean="0"/>
+              <a:rPr lang="en-US"/>
               <a:t>Fourth level</a:t>
             </a:r>
           </a:p>
           <a:p>
             <a:pPr lvl="4"/>
             <a:r>
-              <a:rPr lang="en-US" smtClean="0"/>
+              <a:rPr lang="en-US"/>
               <a:t>Fifth level</a:t>
             </a:r>
-            <a:endParaRPr lang="en-US"/>
           </a:p>
         </p:txBody>
       </p:sp>
@@ -2237,7 +2235,7 @@
           <a:p>
             <a:pPr lvl="0"/>
             <a:r>
-              <a:rPr lang="en-US" smtClean="0"/>
+              <a:rPr lang="en-US"/>
               <a:t>Click to edit Master text styles</a:t>
             </a:r>
           </a:p>
@@ -2260,7 +2258,7 @@
           <a:p>
             <a:fld id="{5BCAD085-E8A6-8845-BD4E-CB4CCA059FC4}" type="datetimeFigureOut">
               <a:rPr lang="en-US" smtClean="0"/>
-              <a:t>1/27/13</a:t>
+              <a:t>2/12/2026</a:t>
             </a:fld>
             <a:endParaRPr lang="en-US"/>
           </a:p>
@@ -2363,10 +2361,9 @@
           </a:lstStyle>
           <a:p>
             <a:r>
-              <a:rPr lang="en-US" smtClean="0"/>
+              <a:rPr lang="en-US"/>
               <a:t>Click to edit Master title style</a:t>
             </a:r>
-            <a:endParaRPr lang="en-US"/>
           </a:p>
         </p:txBody>
       </p:sp>
@@ -2490,7 +2487,7 @@
           <a:p>
             <a:pPr lvl="0"/>
             <a:r>
-              <a:rPr lang="en-US" smtClean="0"/>
+              <a:rPr lang="en-US"/>
               <a:t>Click to edit Master text styles</a:t>
             </a:r>
           </a:p>
@@ -2513,7 +2510,7 @@
           <a:p>
             <a:fld id="{5BCAD085-E8A6-8845-BD4E-CB4CCA059FC4}" type="datetimeFigureOut">
               <a:rPr lang="en-US" smtClean="0"/>
-              <a:t>1/27/13</a:t>
+              <a:t>2/12/2026</a:t>
             </a:fld>
             <a:endParaRPr lang="en-US"/>
           </a:p>
@@ -2622,10 +2619,9 @@
           <a:lstStyle/>
           <a:p>
             <a:r>
-              <a:rPr lang="en-US" smtClean="0"/>
+              <a:rPr lang="en-US"/>
               <a:t>Click to edit Master title style</a:t>
             </a:r>
-            <a:endParaRPr lang="en-US"/>
           </a:p>
         </p:txBody>
       </p:sp>
@@ -2656,38 +2652,37 @@
           <a:p>
             <a:pPr lvl="0"/>
             <a:r>
-              <a:rPr lang="en-US" smtClean="0"/>
+              <a:rPr lang="en-US"/>
               <a:t>Click to edit Master text styles</a:t>
             </a:r>
           </a:p>
           <a:p>
             <a:pPr lvl="1"/>
             <a:r>
-              <a:rPr lang="en-US" smtClean="0"/>
+              <a:rPr lang="en-US"/>
               <a:t>Second level</a:t>
             </a:r>
           </a:p>
           <a:p>
             <a:pPr lvl="2"/>
             <a:r>
-              <a:rPr lang="en-US" smtClean="0"/>
+              <a:rPr lang="en-US"/>
               <a:t>Third level</a:t>
             </a:r>
           </a:p>
           <a:p>
             <a:pPr lvl="3"/>
             <a:r>
-              <a:rPr lang="en-US" smtClean="0"/>
+              <a:rPr lang="en-US"/>
               <a:t>Fourth level</a:t>
             </a:r>
           </a:p>
           <a:p>
             <a:pPr lvl="4"/>
             <a:r>
-              <a:rPr lang="en-US" smtClean="0"/>
+              <a:rPr lang="en-US"/>
               <a:t>Fifth level</a:t>
             </a:r>
-            <a:endParaRPr lang="en-US"/>
           </a:p>
         </p:txBody>
       </p:sp>
@@ -2726,7 +2721,7 @@
           <a:p>
             <a:fld id="{5BCAD085-E8A6-8845-BD4E-CB4CCA059FC4}" type="datetimeFigureOut">
               <a:rPr lang="en-US" smtClean="0"/>
-              <a:t>1/27/13</a:t>
+              <a:t>2/12/2026</a:t>
             </a:fld>
             <a:endParaRPr lang="en-US"/>
           </a:p>
@@ -3085,7 +3080,7 @@
 </file>
 
 <file path=ppt/slides/slide1.xml><?xml version="1.0" encoding="utf-8"?>
-<p:sld xmlns:a="http://schemas.openxmlformats.org/drawingml/2006/main" xmlns:p="http://schemas.openxmlformats.org/presentationml/2006/main" xmlns:r="http://schemas.openxmlformats.org/officeDocument/2006/relationships">
+<p:sld xmlns:a="http://schemas.openxmlformats.org/drawingml/2006/main" xmlns:r="http://schemas.openxmlformats.org/officeDocument/2006/relationships" xmlns:p="http://schemas.openxmlformats.org/presentationml/2006/main">
   <p:cSld>
     <p:spTree>
       <p:nvGrpSpPr>
@@ -3093,24 +3088,14 @@
         <p:cNvGrpSpPr/>
         <p:nvPr/>
       </p:nvGrpSpPr>
-      <p:grpSpPr/>
-      <p:sp>
-        <p:nvSpPr>
-          <p:cNvPr id="2" name="Title 1"/>
-          <p:cNvSpPr>
-            <a:spLocks noGrp="1"/>
-          </p:cNvSpPr>
-          <p:nvPr>
-            <p:ph type="title"/>
-          </p:nvPr>
-        </p:nvSpPr>
-        <p:spPr/>
-        <p:txBody>
-          <a:bodyPr/>
-          <a:lstStyle/>
-          <a:p/>
-        </p:txBody>
-      </p:sp>
+      <p:grpSpPr>
+        <a:xfrm>
+          <a:off x="0" y="0"/>
+          <a:ext cx="0" cy="0"/>
+          <a:chOff x="0" y="0"/>
+          <a:chExt cx="0" cy="0"/>
+        </a:xfrm>
+      </p:grpSpPr>
       <p:sp>
         <p:nvSpPr>
           <p:cNvPr id="3" name="TextBox 2"/>
@@ -3369,7 +3354,7 @@
 </file>
 
 <file path=ppt/slides/slide2.xml><?xml version="1.0" encoding="utf-8"?>
-<p:sld xmlns:a="http://schemas.openxmlformats.org/drawingml/2006/main" xmlns:p="http://schemas.openxmlformats.org/presentationml/2006/main" xmlns:r="http://schemas.openxmlformats.org/officeDocument/2006/relationships">
+<p:sld xmlns:a="http://schemas.openxmlformats.org/drawingml/2006/main" xmlns:r="http://schemas.openxmlformats.org/officeDocument/2006/relationships" xmlns:p="http://schemas.openxmlformats.org/presentationml/2006/main">
   <p:cSld>
     <p:spTree>
       <p:nvGrpSpPr>
@@ -3377,24 +3362,14 @@
         <p:cNvGrpSpPr/>
         <p:nvPr/>
       </p:nvGrpSpPr>
-      <p:grpSpPr/>
-      <p:sp>
-        <p:nvSpPr>
-          <p:cNvPr id="2" name="Title 1"/>
-          <p:cNvSpPr>
-            <a:spLocks noGrp="1"/>
-          </p:cNvSpPr>
-          <p:nvPr>
-            <p:ph type="title"/>
-          </p:nvPr>
-        </p:nvSpPr>
-        <p:spPr/>
-        <p:txBody>
-          <a:bodyPr/>
-          <a:lstStyle/>
-          <a:p/>
-        </p:txBody>
-      </p:sp>
+      <p:grpSpPr>
+        <a:xfrm>
+          <a:off x="0" y="0"/>
+          <a:ext cx="0" cy="0"/>
+          <a:chOff x="0" y="0"/>
+          <a:chExt cx="0" cy="0"/>
+        </a:xfrm>
+      </p:grpSpPr>
       <p:sp>
         <p:nvSpPr>
           <p:cNvPr id="3" name="TextBox 2"/>
@@ -3435,7 +3410,7 @@
         <p:spPr>
           <a:xfrm>
             <a:off x="914400" y="1097280"/>
-            <a:ext cx="1828800" cy="731520"/>
+            <a:ext cx="2743200" cy="731520"/>
           </a:xfrm>
           <a:prstGeom prst="rect">
             <a:avLst/>
@@ -3449,10 +3424,10 @@
           <a:lstStyle/>
           <a:p>
             <a:pPr>
-              <a:defRPr sz="2400" b="1"/>
+              <a:defRPr sz="2200" b="1"/>
             </a:pPr>
             <a:r>
-              <a:t>QC PASS</a:t>
+              <a:t>DATA QUALITY: EXCELLENT</a:t>
             </a:r>
           </a:p>
         </p:txBody>
@@ -3530,7 +3505,7 @@
               <a:defRPr sz="1200"/>
             </a:pPr>
             <a:r>
-              <a:t>Cadence OK</a:t>
+              <a:t>Sample Rate</a:t>
             </a:r>
           </a:p>
         </p:txBody>
@@ -3608,7 +3583,7 @@
               <a:defRPr sz="1200"/>
             </a:pPr>
             <a:r>
-              <a:t>Speed-XY Corr</a:t>
+              <a:t>GPS Accuracy</a:t>
             </a:r>
           </a:p>
         </p:txBody>
@@ -3639,7 +3614,7 @@
               <a:defRPr sz="1800" b="1"/>
             </a:pPr>
             <a:r>
-              <a:t>Definitions &amp; Methodology</a:t>
+              <a:t>How We Measured Performance</a:t>
             </a:r>
           </a:p>
         </p:txBody>
@@ -3670,25 +3645,73 @@
               <a:defRPr sz="1100" b="0"/>
             </a:pPr>
             <a:r>
-              <a:t>Speed Bands (mph): Standing (0.0-1.0), Walking (1.0-4.0), Jogging (4.0-8.0), Running (8.0-13.0), High-Speed (13.0-16.0), Sprint (16.0-∞)</a:t>
-            </a:r>
-            <a:br/>
-            <a:br/>
-            <a:r>
-              <a:t>Thresholds: HSR ≥13.0 mph, Sprint ≥16.0 mph, Accel ≥2.0 m/s², Decel ≤-2.0 m/s²</a:t>
-            </a:r>
-            <a:br/>
-            <a:br/>
-            <a:r>
-              <a:t>Event Detection: Sustained threshold exposure ≥1.0s</a:t>
-            </a:r>
-            <a:br/>
-            <a:r>
-              <a:t>Distance Source: Speed-integrated (s×dt); vendor 'dis' column rejected due to systematic error</a:t>
-            </a:r>
-            <a:br/>
-            <a:r>
-              <a:t>Validation: XY-derived distance correlation = 0.979 (validates speed channel)</a:t>
+              <a:rPr dirty="0"/>
+              <a:t>Speed Zones (mph): Standing (0.0-1.0), Walking (1.0-4.0), Jogging (4.0-8.0), Running (8.0-13.0), High-Speed (13.0-16.0), Sprint (16.0-∞)</a:t>
+            </a:r>
+            <a:br>
+              <a:rPr dirty="0"/>
+            </a:br>
+            <a:br>
+              <a:rPr dirty="0"/>
+            </a:br>
+            <a:r>
+              <a:rPr dirty="0"/>
+              <a:t>High-Intensity Thresholds:</a:t>
+            </a:r>
+            <a:br>
+              <a:rPr dirty="0"/>
+            </a:br>
+            <a:r>
+              <a:rPr dirty="0"/>
+              <a:t>  • High-Speed Running (HSR): ≥13.0 mph</a:t>
+            </a:r>
+            <a:br>
+              <a:rPr dirty="0"/>
+            </a:br>
+            <a:r>
+              <a:rPr dirty="0"/>
+              <a:t>  • Sprint: ≥16.0 mph</a:t>
+            </a:r>
+            <a:br>
+              <a:rPr dirty="0"/>
+            </a:br>
+            <a:r>
+              <a:rPr dirty="0"/>
+              <a:t>  • Hard Acceleration: ≥2.0 m/s²</a:t>
+            </a:r>
+            <a:br>
+              <a:rPr dirty="0"/>
+            </a:br>
+            <a:r>
+              <a:rPr dirty="0"/>
+              <a:t>  • Hard Deceleration: ≤-2.0 m/s²</a:t>
+            </a:r>
+            <a:br>
+              <a:rPr dirty="0"/>
+            </a:br>
+            <a:br>
+              <a:rPr dirty="0"/>
+            </a:br>
+            <a:r>
+              <a:rPr dirty="0"/>
+              <a:t>Event Definition: Sustained effort lasting at least 1 second</a:t>
+            </a:r>
+            <a:br>
+              <a:rPr dirty="0"/>
+            </a:br>
+            <a:br>
+              <a:rPr dirty="0"/>
+            </a:br>
+            <a:r>
+              <a:rPr dirty="0"/>
+              <a:t>GPS Accuracy Score: 0.979 (Excellent - data is highly reliable)</a:t>
+            </a:r>
+            <a:br>
+              <a:rPr dirty="0"/>
+            </a:br>
+            <a:r>
+              <a:rPr dirty="0"/>
+              <a:t>• This score confirms GPS position tracking matches actual speed measurements</a:t>
             </a:r>
           </a:p>
         </p:txBody>
@@ -3702,7 +3725,7 @@
 </file>
 
 <file path=ppt/slides/slide3.xml><?xml version="1.0" encoding="utf-8"?>
-<p:sld xmlns:a="http://schemas.openxmlformats.org/drawingml/2006/main" xmlns:p="http://schemas.openxmlformats.org/presentationml/2006/main" xmlns:r="http://schemas.openxmlformats.org/officeDocument/2006/relationships">
+<p:sld xmlns:a="http://schemas.openxmlformats.org/drawingml/2006/main" xmlns:r="http://schemas.openxmlformats.org/officeDocument/2006/relationships" xmlns:p="http://schemas.openxmlformats.org/presentationml/2006/main">
   <p:cSld>
     <p:spTree>
       <p:nvGrpSpPr>
@@ -3710,24 +3733,14 @@
         <p:cNvGrpSpPr/>
         <p:nvPr/>
       </p:nvGrpSpPr>
-      <p:grpSpPr/>
-      <p:sp>
-        <p:nvSpPr>
-          <p:cNvPr id="2" name="Title 1"/>
-          <p:cNvSpPr>
-            <a:spLocks noGrp="1"/>
-          </p:cNvSpPr>
-          <p:nvPr>
-            <p:ph type="title"/>
-          </p:nvPr>
-        </p:nvSpPr>
-        <p:spPr/>
-        <p:txBody>
-          <a:bodyPr/>
-          <a:lstStyle/>
-          <a:p/>
-        </p:txBody>
-      </p:sp>
+      <p:grpSpPr>
+        <a:xfrm>
+          <a:off x="0" y="0"/>
+          <a:ext cx="0" cy="0"/>
+          <a:chOff x="0" y="0"/>
+          <a:chExt cx="0" cy="0"/>
+        </a:xfrm>
+      </p:grpSpPr>
       <p:sp>
         <p:nvSpPr>
           <p:cNvPr id="3" name="TextBox 2"/>
@@ -3736,8 +3749,8 @@
         </p:nvSpPr>
         <p:spPr>
           <a:xfrm>
-            <a:off x="457200" y="274320"/>
-            <a:ext cx="8229600" cy="548640"/>
+            <a:off x="457200" y="182880"/>
+            <a:ext cx="8229600" cy="457200"/>
           </a:xfrm>
           <a:prstGeom prst="rect">
             <a:avLst/>
@@ -3751,10 +3764,10 @@
           <a:lstStyle/>
           <a:p>
             <a:pPr>
-              <a:defRPr sz="2600" b="1"/>
+              <a:defRPr sz="2800" b="1"/>
             </a:pPr>
             <a:r>
-              <a:t>Where: Spatial Movement &amp; Position Heatmap</a:t>
+              <a:t>Field Coverage &amp; Movement Patterns</a:t>
             </a:r>
           </a:p>
         </p:txBody>
@@ -3775,8 +3788,8 @@
         </p:blipFill>
         <p:spPr>
           <a:xfrm>
-            <a:off x="457200" y="914400"/>
-            <a:ext cx="8229600" cy="4674413"/>
+            <a:off x="274320" y="987918"/>
+            <a:ext cx="8595360" cy="4882164"/>
           </a:xfrm>
           <a:prstGeom prst="rect">
             <a:avLst/>
@@ -3792,7 +3805,7 @@
 </file>
 
 <file path=ppt/slides/slide4.xml><?xml version="1.0" encoding="utf-8"?>
-<p:sld xmlns:a="http://schemas.openxmlformats.org/drawingml/2006/main" xmlns:p="http://schemas.openxmlformats.org/presentationml/2006/main" xmlns:r="http://schemas.openxmlformats.org/officeDocument/2006/relationships">
+<p:sld xmlns:a="http://schemas.openxmlformats.org/drawingml/2006/main" xmlns:r="http://schemas.openxmlformats.org/officeDocument/2006/relationships" xmlns:p="http://schemas.openxmlformats.org/presentationml/2006/main">
   <p:cSld>
     <p:spTree>
       <p:nvGrpSpPr>
@@ -3800,24 +3813,14 @@
         <p:cNvGrpSpPr/>
         <p:nvPr/>
       </p:nvGrpSpPr>
-      <p:grpSpPr/>
-      <p:sp>
-        <p:nvSpPr>
-          <p:cNvPr id="2" name="Title 1"/>
-          <p:cNvSpPr>
-            <a:spLocks noGrp="1"/>
-          </p:cNvSpPr>
-          <p:nvPr>
-            <p:ph type="title"/>
-          </p:nvPr>
-        </p:nvSpPr>
-        <p:spPr/>
-        <p:txBody>
-          <a:bodyPr/>
-          <a:lstStyle/>
-          <a:p/>
-        </p:txBody>
-      </p:sp>
+      <p:grpSpPr>
+        <a:xfrm>
+          <a:off x="0" y="0"/>
+          <a:ext cx="0" cy="0"/>
+          <a:chOff x="0" y="0"/>
+          <a:chExt cx="0" cy="0"/>
+        </a:xfrm>
+      </p:grpSpPr>
       <p:sp>
         <p:nvSpPr>
           <p:cNvPr id="3" name="TextBox 2"/>
@@ -3826,8 +3829,8 @@
         </p:nvSpPr>
         <p:spPr>
           <a:xfrm>
-            <a:off x="457200" y="274320"/>
-            <a:ext cx="8229600" cy="548640"/>
+            <a:off x="457200" y="182880"/>
+            <a:ext cx="8229600" cy="457200"/>
           </a:xfrm>
           <a:prstGeom prst="rect">
             <a:avLst/>
@@ -3844,7 +3847,7 @@
               <a:defRPr sz="2600" b="1"/>
             </a:pPr>
             <a:r>
-              <a:t>When: Speed Timeline &amp; Session Phases</a:t>
+              <a:t>Intensity Over Time: When Did Peak Efforts Occur?</a:t>
             </a:r>
           </a:p>
         </p:txBody>
@@ -3865,14 +3868,181 @@
         </p:blipFill>
         <p:spPr>
           <a:xfrm>
-            <a:off x="457200" y="914400"/>
-            <a:ext cx="8229600" cy="4882024"/>
+            <a:off x="457200" y="713233"/>
+            <a:ext cx="8074152" cy="4789808"/>
           </a:xfrm>
           <a:prstGeom prst="rect">
             <a:avLst/>
           </a:prstGeom>
         </p:spPr>
       </p:pic>
+      <p:sp>
+        <p:nvSpPr>
+          <p:cNvPr id="5" name="TextBox 4">
+            <a:extLst>
+              <a:ext uri="{FF2B5EF4-FFF2-40B4-BE49-F238E27FC236}">
+                <a16:creationId xmlns:a16="http://schemas.microsoft.com/office/drawing/2014/main" id="{F03814AE-62B7-BE6F-1575-F9849507F116}"/>
+              </a:ext>
+            </a:extLst>
+          </p:cNvPr>
+          <p:cNvSpPr txBox="1"/>
+          <p:nvPr/>
+        </p:nvSpPr>
+        <p:spPr>
+          <a:xfrm>
+            <a:off x="786384" y="5678424"/>
+            <a:ext cx="3291840" cy="938719"/>
+          </a:xfrm>
+          <a:prstGeom prst="rect">
+            <a:avLst/>
+          </a:prstGeom>
+          <a:noFill/>
+        </p:spPr>
+        <p:txBody>
+          <a:bodyPr wrap="square">
+            <a:spAutoFit/>
+          </a:bodyPr>
+          <a:lstStyle/>
+          <a:p>
+            <a:r>
+              <a:rPr lang="en-US" sz="1100" b="1" dirty="0"/>
+              <a:t>Gray (Rest)</a:t>
+            </a:r>
+            <a:r>
+              <a:rPr lang="en-US" sz="1100" dirty="0"/>
+              <a:t>: Standing/walking recovery periods</a:t>
+            </a:r>
+          </a:p>
+          <a:p>
+            <a:r>
+              <a:rPr lang="en-US" sz="1100" b="1" dirty="0"/>
+              <a:t>Light Blue (Low)</a:t>
+            </a:r>
+            <a:r>
+              <a:rPr lang="en-US" sz="1100" dirty="0"/>
+              <a:t>: Light jogging/warm-up activity</a:t>
+            </a:r>
+          </a:p>
+          <a:p>
+            <a:r>
+              <a:rPr lang="en-US" sz="1100" b="1" dirty="0"/>
+              <a:t>Medium Blue (Moderate)</a:t>
+            </a:r>
+            <a:r>
+              <a:rPr lang="en-US" sz="1100" dirty="0"/>
+              <a:t>: Steady running</a:t>
+            </a:r>
+          </a:p>
+          <a:p>
+            <a:r>
+              <a:rPr lang="en-US" sz="1100" b="1" dirty="0"/>
+              <a:t>Orange (Moderate-High)</a:t>
+            </a:r>
+            <a:r>
+              <a:rPr lang="en-US" sz="1100" dirty="0"/>
+              <a:t>: Elevated tempo work</a:t>
+            </a:r>
+          </a:p>
+          <a:p>
+            <a:r>
+              <a:rPr lang="en-US" sz="1100" b="1" dirty="0"/>
+              <a:t>Red (High)</a:t>
+            </a:r>
+            <a:r>
+              <a:rPr lang="en-US" sz="1100" dirty="0"/>
+              <a:t>: Sprint work and maximum efforts</a:t>
+            </a:r>
+          </a:p>
+        </p:txBody>
+      </p:sp>
+      <p:sp>
+        <p:nvSpPr>
+          <p:cNvPr id="6" name="TextBox 5">
+            <a:extLst>
+              <a:ext uri="{FF2B5EF4-FFF2-40B4-BE49-F238E27FC236}">
+                <a16:creationId xmlns:a16="http://schemas.microsoft.com/office/drawing/2014/main" id="{8659B01A-C0D5-4D25-0F4D-13098297008F}"/>
+              </a:ext>
+            </a:extLst>
+          </p:cNvPr>
+          <p:cNvSpPr txBox="1"/>
+          <p:nvPr/>
+        </p:nvSpPr>
+        <p:spPr>
+          <a:xfrm>
+            <a:off x="4349496" y="5576194"/>
+            <a:ext cx="4181856" cy="1277273"/>
+          </a:xfrm>
+          <a:prstGeom prst="rect">
+            <a:avLst/>
+          </a:prstGeom>
+          <a:noFill/>
+        </p:spPr>
+        <p:txBody>
+          <a:bodyPr wrap="square">
+            <a:spAutoFit/>
+          </a:bodyPr>
+          <a:lstStyle/>
+          <a:p>
+            <a:r>
+              <a:rPr lang="en-US" sz="1100" dirty="0"/>
+              <a:t>✓ </a:t>
+            </a:r>
+            <a:r>
+              <a:rPr lang="en-US" sz="1100" b="1" dirty="0"/>
+              <a:t>"When did we do high-intensity work?"</a:t>
+            </a:r>
+            <a:r>
+              <a:rPr lang="en-US" sz="1100" dirty="0"/>
+              <a:t> - Red/orange segments show sprint drills</a:t>
+            </a:r>
+            <a:br>
+              <a:rPr lang="en-US" sz="1100" dirty="0"/>
+            </a:br>
+            <a:r>
+              <a:rPr lang="en-US" sz="1100" dirty="0"/>
+              <a:t>✓ </a:t>
+            </a:r>
+            <a:r>
+              <a:rPr lang="en-US" sz="1100" b="1" dirty="0"/>
+              <a:t>"Was recovery adequate?"</a:t>
+            </a:r>
+            <a:r>
+              <a:rPr lang="en-US" sz="1100" dirty="0"/>
+              <a:t> - Gray segments between hard efforts show rest periods</a:t>
+            </a:r>
+            <a:br>
+              <a:rPr lang="en-US" sz="1100" dirty="0"/>
+            </a:br>
+            <a:r>
+              <a:rPr lang="en-US" sz="1100" dirty="0"/>
+              <a:t>✓ </a:t>
+            </a:r>
+            <a:r>
+              <a:rPr lang="en-US" sz="1100" b="1" dirty="0"/>
+              <a:t>"How was the session structured?"</a:t>
+            </a:r>
+            <a:r>
+              <a:rPr lang="en-US" sz="1100" dirty="0"/>
+              <a:t> - You can see the drill-by-drill flow</a:t>
+            </a:r>
+            <a:br>
+              <a:rPr lang="en-US" sz="1100" dirty="0"/>
+            </a:br>
+            <a:r>
+              <a:rPr lang="en-US" sz="1100" dirty="0"/>
+              <a:t>✓ </a:t>
+            </a:r>
+            <a:r>
+              <a:rPr lang="en-US" sz="1100" b="1" dirty="0"/>
+              <a:t>"Did intensity drop late in practice?"</a:t>
+            </a:r>
+            <a:r>
+              <a:rPr lang="en-US" sz="1100" dirty="0"/>
+              <a:t> - Compare colors early vs. late</a:t>
+            </a:r>
+          </a:p>
+        </p:txBody>
+      </p:sp>
     </p:spTree>
   </p:cSld>
   <p:clrMapOvr>
@@ -3882,7 +4052,7 @@
 </file>
 
 <file path=ppt/slides/slide5.xml><?xml version="1.0" encoding="utf-8"?>
-<p:sld xmlns:a="http://schemas.openxmlformats.org/drawingml/2006/main" xmlns:p="http://schemas.openxmlformats.org/presentationml/2006/main" xmlns:r="http://schemas.openxmlformats.org/officeDocument/2006/relationships">
+<p:sld xmlns:a="http://schemas.openxmlformats.org/drawingml/2006/main" xmlns:r="http://schemas.openxmlformats.org/officeDocument/2006/relationships" xmlns:p="http://schemas.openxmlformats.org/presentationml/2006/main">
   <p:cSld>
     <p:spTree>
       <p:nvGrpSpPr>
@@ -3890,24 +4060,14 @@
         <p:cNvGrpSpPr/>
         <p:nvPr/>
       </p:nvGrpSpPr>
-      <p:grpSpPr/>
-      <p:sp>
-        <p:nvSpPr>
-          <p:cNvPr id="2" name="Title 1"/>
-          <p:cNvSpPr>
-            <a:spLocks noGrp="1"/>
-          </p:cNvSpPr>
-          <p:nvPr>
-            <p:ph type="title"/>
-          </p:nvPr>
-        </p:nvSpPr>
-        <p:spPr/>
-        <p:txBody>
-          <a:bodyPr/>
-          <a:lstStyle/>
-          <a:p/>
-        </p:txBody>
-      </p:sp>
+      <p:grpSpPr>
+        <a:xfrm>
+          <a:off x="0" y="0"/>
+          <a:ext cx="0" cy="0"/>
+          <a:chOff x="0" y="0"/>
+          <a:chExt cx="0" cy="0"/>
+        </a:xfrm>
+      </p:grpSpPr>
       <p:sp>
         <p:nvSpPr>
           <p:cNvPr id="3" name="TextBox 2"/>
@@ -3916,8 +4076,8 @@
         </p:nvSpPr>
         <p:spPr>
           <a:xfrm>
-            <a:off x="457200" y="274320"/>
-            <a:ext cx="8229600" cy="548640"/>
+            <a:off x="457200" y="182880"/>
+            <a:ext cx="8229600" cy="457200"/>
           </a:xfrm>
           <a:prstGeom prst="rect">
             <a:avLst/>
@@ -3931,10 +4091,10 @@
           <a:lstStyle/>
           <a:p>
             <a:pPr>
-              <a:defRPr sz="2600" b="1"/>
+              <a:defRPr sz="2800" b="1"/>
             </a:pPr>
             <a:r>
-              <a:t>What: Peak Demand Profile</a:t>
+              <a:t>Peak Performance Demands</a:t>
             </a:r>
           </a:p>
         </p:txBody>
@@ -3955,8 +4115,8 @@
         </p:blipFill>
         <p:spPr>
           <a:xfrm>
-            <a:off x="914400" y="914400"/>
-            <a:ext cx="7315200" cy="3941168"/>
+            <a:off x="457200" y="731520"/>
+            <a:ext cx="8229600" cy="4433814"/>
           </a:xfrm>
           <a:prstGeom prst="rect">
             <a:avLst/>
@@ -3969,11 +4129,17 @@
           <p:cNvGraphicFramePr>
             <a:graphicFrameLocks noGrp="1"/>
           </p:cNvGraphicFramePr>
-          <p:nvPr/>
+          <p:nvPr>
+            <p:extLst>
+              <p:ext uri="{D42A27DB-BD31-4B8C-83A1-F6EECF244321}">
+                <p14:modId xmlns:p14="http://schemas.microsoft.com/office/powerpoint/2010/main" val="3311030236"/>
+              </p:ext>
+            </p:extLst>
+          </p:nvPr>
         </p:nvGraphicFramePr>
         <p:xfrm>
-          <a:off x="5029200" y="4114800"/>
-          <a:ext cx="3200400" cy="2103120"/>
+          <a:off x="5230368" y="5165334"/>
+          <a:ext cx="3118104" cy="1615440"/>
         </p:xfrm>
         <a:graphic>
           <a:graphicData uri="http://schemas.openxmlformats.org/drawingml/2006/table">
@@ -3982,42 +4148,59 @@
                 <a:tableStyleId>{5C22544A-7EE6-4342-B048-85BDC9FD1C3A}</a:tableStyleId>
               </a:tblPr>
               <a:tblGrid>
-                <a:gridCol w="1600200"/>
-                <a:gridCol w="1600200"/>
+                <a:gridCol w="1559052">
+                  <a:extLst>
+                    <a:ext uri="{9D8B030D-6E8A-4147-A177-3AD203B41FA5}">
+                      <a16:colId xmlns:a16="http://schemas.microsoft.com/office/drawing/2014/main" val="20000"/>
+                    </a:ext>
+                  </a:extLst>
+                </a:gridCol>
+                <a:gridCol w="1559052">
+                  <a:extLst>
+                    <a:ext uri="{9D8B030D-6E8A-4147-A177-3AD203B41FA5}">
+                      <a16:colId xmlns:a16="http://schemas.microsoft.com/office/drawing/2014/main" val="20001"/>
+                    </a:ext>
+                  </a:extLst>
+                </a:gridCol>
               </a:tblGrid>
-              <a:tr h="300445">
-                <a:tc>
-                  <a:txBody>
-                    <a:bodyPr/>
-                    <a:lstStyle/>
-                    <a:p>
-                      <a:pPr>
-                        <a:defRPr b="1" sz="1000"/>
-                      </a:pPr>
-                      <a:r>
-                        <a:t>Metric</a:t>
-                      </a:r>
-                    </a:p>
-                  </a:txBody>
-                  <a:tcPr/>
-                </a:tc>
-                <a:tc>
-                  <a:txBody>
-                    <a:bodyPr/>
-                    <a:lstStyle/>
-                    <a:p>
-                      <a:pPr>
-                        <a:defRPr b="1" sz="1000"/>
-                      </a:pPr>
-                      <a:r>
-                        <a:t>Value</a:t>
-                      </a:r>
-                    </a:p>
-                  </a:txBody>
-                  <a:tcPr/>
-                </a:tc>
+              <a:tr h="225987">
+                <a:tc>
+                  <a:txBody>
+                    <a:bodyPr/>
+                    <a:lstStyle/>
+                    <a:p>
+                      <a:pPr>
+                        <a:defRPr sz="1000" b="1"/>
+                      </a:pPr>
+                      <a:r>
+                        <a:t>Effort Type</a:t>
+                      </a:r>
+                    </a:p>
+                  </a:txBody>
+                  <a:tcPr/>
+                </a:tc>
+                <a:tc>
+                  <a:txBody>
+                    <a:bodyPr/>
+                    <a:lstStyle/>
+                    <a:p>
+                      <a:pPr>
+                        <a:defRPr sz="1000" b="1"/>
+                      </a:pPr>
+                      <a:r>
+                        <a:t>Count / Value</a:t>
+                      </a:r>
+                    </a:p>
+                  </a:txBody>
+                  <a:tcPr/>
+                </a:tc>
+                <a:extLst>
+                  <a:ext uri="{0D108BD9-81ED-4DB2-BD59-A6C34878D82A}">
+                    <a16:rowId xmlns:a16="http://schemas.microsoft.com/office/drawing/2014/main" val="10000"/>
+                  </a:ext>
+                </a:extLst>
               </a:tr>
-              <a:tr h="300445">
+              <a:tr h="225987">
                 <a:tc>
                   <a:txBody>
                     <a:bodyPr/>
@@ -4027,7 +4210,7 @@
                         <a:defRPr sz="900"/>
                       </a:pPr>
                       <a:r>
-                        <a:t>HSR Events</a:t>
+                        <a:t>High-Speed Runs (≥13 mph)</a:t>
                       </a:r>
                     </a:p>
                   </a:txBody>
@@ -4042,14 +4225,19 @@
                         <a:defRPr sz="900"/>
                       </a:pPr>
                       <a:r>
-                        <a:t>6.0</a:t>
-                      </a:r>
-                    </a:p>
-                  </a:txBody>
-                  <a:tcPr/>
-                </a:tc>
+                        <a:t>6 efforts</a:t>
+                      </a:r>
+                    </a:p>
+                  </a:txBody>
+                  <a:tcPr/>
+                </a:tc>
+                <a:extLst>
+                  <a:ext uri="{0D108BD9-81ED-4DB2-BD59-A6C34878D82A}">
+                    <a16:rowId xmlns:a16="http://schemas.microsoft.com/office/drawing/2014/main" val="10001"/>
+                  </a:ext>
+                </a:extLst>
               </a:tr>
-              <a:tr h="300445">
+              <a:tr h="225987">
                 <a:tc>
                   <a:txBody>
                     <a:bodyPr/>
@@ -4059,7 +4247,8 @@
                         <a:defRPr sz="900"/>
                       </a:pPr>
                       <a:r>
-                        <a:t>Sprint Events</a:t>
+                        <a:rPr dirty="0"/>
+                        <a:t>Sprints (≥16 mph)</a:t>
                       </a:r>
                     </a:p>
                   </a:txBody>
@@ -4074,14 +4263,19 @@
                         <a:defRPr sz="900"/>
                       </a:pPr>
                       <a:r>
-                        <a:t>4.0</a:t>
-                      </a:r>
-                    </a:p>
-                  </a:txBody>
-                  <a:tcPr/>
-                </a:tc>
+                        <a:t>4 efforts</a:t>
+                      </a:r>
+                    </a:p>
+                  </a:txBody>
+                  <a:tcPr/>
+                </a:tc>
+                <a:extLst>
+                  <a:ext uri="{0D108BD9-81ED-4DB2-BD59-A6C34878D82A}">
+                    <a16:rowId xmlns:a16="http://schemas.microsoft.com/office/drawing/2014/main" val="10002"/>
+                  </a:ext>
+                </a:extLst>
               </a:tr>
-              <a:tr h="300445">
+              <a:tr h="225987">
                 <a:tc>
                   <a:txBody>
                     <a:bodyPr/>
@@ -4091,7 +4285,8 @@
                         <a:defRPr sz="900"/>
                       </a:pPr>
                       <a:r>
-                        <a:t>Accel Events</a:t>
+                        <a:rPr dirty="0"/>
+                        <a:t>Hard Accelerations</a:t>
                       </a:r>
                     </a:p>
                   </a:txBody>
@@ -4106,14 +4301,19 @@
                         <a:defRPr sz="900"/>
                       </a:pPr>
                       <a:r>
-                        <a:t>11.0</a:t>
-                      </a:r>
-                    </a:p>
-                  </a:txBody>
-                  <a:tcPr/>
-                </a:tc>
+                        <a:t>11 efforts</a:t>
+                      </a:r>
+                    </a:p>
+                  </a:txBody>
+                  <a:tcPr/>
+                </a:tc>
+                <a:extLst>
+                  <a:ext uri="{0D108BD9-81ED-4DB2-BD59-A6C34878D82A}">
+                    <a16:rowId xmlns:a16="http://schemas.microsoft.com/office/drawing/2014/main" val="10003"/>
+                  </a:ext>
+                </a:extLst>
               </a:tr>
-              <a:tr h="300445">
+              <a:tr h="225987">
                 <a:tc>
                   <a:txBody>
                     <a:bodyPr/>
@@ -4123,7 +4323,8 @@
                         <a:defRPr sz="900"/>
                       </a:pPr>
                       <a:r>
-                        <a:t>Decel Events</a:t>
+                        <a:rPr dirty="0"/>
+                        <a:t>Hard Decelerations</a:t>
                       </a:r>
                     </a:p>
                   </a:txBody>
@@ -4138,14 +4339,19 @@
                         <a:defRPr sz="900"/>
                       </a:pPr>
                       <a:r>
-                        <a:t>2.0</a:t>
-                      </a:r>
-                    </a:p>
-                  </a:txBody>
-                  <a:tcPr/>
-                </a:tc>
+                        <a:t>2 efforts</a:t>
+                      </a:r>
+                    </a:p>
+                  </a:txBody>
+                  <a:tcPr/>
+                </a:tc>
+                <a:extLst>
+                  <a:ext uri="{0D108BD9-81ED-4DB2-BD59-A6C34878D82A}">
+                    <a16:rowId xmlns:a16="http://schemas.microsoft.com/office/drawing/2014/main" val="10004"/>
+                  </a:ext>
+                </a:extLst>
               </a:tr>
-              <a:tr h="300445">
+              <a:tr h="225987">
                 <a:tc>
                   <a:txBody>
                     <a:bodyPr/>
@@ -4155,7 +4361,8 @@
                         <a:defRPr sz="900"/>
                       </a:pPr>
                       <a:r>
-                        <a:t>Peak Accel</a:t>
+                        <a:rPr dirty="0"/>
+                        <a:t>Max Acceleration</a:t>
                       </a:r>
                     </a:p>
                   </a:txBody>
@@ -4176,8 +4383,13 @@
                   </a:txBody>
                   <a:tcPr/>
                 </a:tc>
+                <a:extLst>
+                  <a:ext uri="{0D108BD9-81ED-4DB2-BD59-A6C34878D82A}">
+                    <a16:rowId xmlns:a16="http://schemas.microsoft.com/office/drawing/2014/main" val="10005"/>
+                  </a:ext>
+                </a:extLst>
               </a:tr>
-              <a:tr h="300450">
+              <a:tr h="225989">
                 <a:tc>
                   <a:txBody>
                     <a:bodyPr/>
@@ -4187,7 +4399,7 @@
                         <a:defRPr sz="900"/>
                       </a:pPr>
                       <a:r>
-                        <a:t>Peak Decel</a:t>
+                        <a:t>Max Deceleration</a:t>
                       </a:r>
                     </a:p>
                   </a:txBody>
@@ -4202,12 +4414,18 @@
                         <a:defRPr sz="900"/>
                       </a:pPr>
                       <a:r>
+                        <a:rPr dirty="0"/>
                         <a:t>-5.12 m/s²</a:t>
                       </a:r>
                     </a:p>
                   </a:txBody>
                   <a:tcPr/>
                 </a:tc>
+                <a:extLst>
+                  <a:ext uri="{0D108BD9-81ED-4DB2-BD59-A6C34878D82A}">
+                    <a16:rowId xmlns:a16="http://schemas.microsoft.com/office/drawing/2014/main" val="10006"/>
+                  </a:ext>
+                </a:extLst>
               </a:tr>
             </a:tbl>
           </a:graphicData>
@@ -4222,7 +4440,7 @@
 </file>
 
 <file path=ppt/slides/slide6.xml><?xml version="1.0" encoding="utf-8"?>
-<p:sld xmlns:a="http://schemas.openxmlformats.org/drawingml/2006/main" xmlns:p="http://schemas.openxmlformats.org/presentationml/2006/main" xmlns:r="http://schemas.openxmlformats.org/officeDocument/2006/relationships">
+<p:sld xmlns:a="http://schemas.openxmlformats.org/drawingml/2006/main" xmlns:r="http://schemas.openxmlformats.org/officeDocument/2006/relationships" xmlns:p="http://schemas.openxmlformats.org/presentationml/2006/main">
   <p:cSld>
     <p:spTree>
       <p:nvGrpSpPr>
@@ -4230,24 +4448,14 @@
         <p:cNvGrpSpPr/>
         <p:nvPr/>
       </p:nvGrpSpPr>
-      <p:grpSpPr/>
-      <p:sp>
-        <p:nvSpPr>
-          <p:cNvPr id="2" name="Title 1"/>
-          <p:cNvSpPr>
-            <a:spLocks noGrp="1"/>
-          </p:cNvSpPr>
-          <p:nvPr>
-            <p:ph type="title"/>
-          </p:nvPr>
-        </p:nvSpPr>
-        <p:spPr/>
-        <p:txBody>
-          <a:bodyPr/>
-          <a:lstStyle/>
-          <a:p/>
-        </p:txBody>
-      </p:sp>
+      <p:grpSpPr>
+        <a:xfrm>
+          <a:off x="0" y="0"/>
+          <a:ext cx="0" cy="0"/>
+          <a:chOff x="0" y="0"/>
+          <a:chExt cx="0" cy="0"/>
+        </a:xfrm>
+      </p:grpSpPr>
       <p:sp>
         <p:nvSpPr>
           <p:cNvPr id="3" name="TextBox 2"/>
@@ -4256,8 +4464,8 @@
         </p:nvSpPr>
         <p:spPr>
           <a:xfrm>
-            <a:off x="457200" y="274320"/>
-            <a:ext cx="8229600" cy="548640"/>
+            <a:off x="457200" y="182880"/>
+            <a:ext cx="8229600" cy="457200"/>
           </a:xfrm>
           <a:prstGeom prst="rect">
             <a:avLst/>
@@ -4274,7 +4482,7 @@
               <a:defRPr sz="2600" b="1"/>
             </a:pPr>
             <a:r>
-              <a:t>Early vs Late: Fatigue &amp; Output Sustainability</a:t>
+              <a:t>First Half vs Second Half: Measuring Fatigue</a:t>
             </a:r>
           </a:p>
         </p:txBody>
@@ -4339,8 +4547,8 @@
           <p:nvPr/>
         </p:nvGraphicFramePr>
         <p:xfrm>
-          <a:off x="4572000" y="1097280"/>
-          <a:ext cx="4114800" cy="2011680"/>
+          <a:off x="4389120" y="1097280"/>
+          <a:ext cx="4297680" cy="2011680"/>
         </p:xfrm>
         <a:graphic>
           <a:graphicData uri="http://schemas.openxmlformats.org/drawingml/2006/table">
@@ -4349,11 +4557,41 @@
                 <a:tableStyleId>{5C22544A-7EE6-4342-B048-85BDC9FD1C3A}</a:tableStyleId>
               </a:tblPr>
               <a:tblGrid>
-                <a:gridCol w="822960"/>
-                <a:gridCol w="822960"/>
-                <a:gridCol w="822960"/>
-                <a:gridCol w="822960"/>
-                <a:gridCol w="822960"/>
+                <a:gridCol w="859536">
+                  <a:extLst>
+                    <a:ext uri="{9D8B030D-6E8A-4147-A177-3AD203B41FA5}">
+                      <a16:colId xmlns:a16="http://schemas.microsoft.com/office/drawing/2014/main" val="20000"/>
+                    </a:ext>
+                  </a:extLst>
+                </a:gridCol>
+                <a:gridCol w="859536">
+                  <a:extLst>
+                    <a:ext uri="{9D8B030D-6E8A-4147-A177-3AD203B41FA5}">
+                      <a16:colId xmlns:a16="http://schemas.microsoft.com/office/drawing/2014/main" val="20001"/>
+                    </a:ext>
+                  </a:extLst>
+                </a:gridCol>
+                <a:gridCol w="859536">
+                  <a:extLst>
+                    <a:ext uri="{9D8B030D-6E8A-4147-A177-3AD203B41FA5}">
+                      <a16:colId xmlns:a16="http://schemas.microsoft.com/office/drawing/2014/main" val="20002"/>
+                    </a:ext>
+                  </a:extLst>
+                </a:gridCol>
+                <a:gridCol w="859536">
+                  <a:extLst>
+                    <a:ext uri="{9D8B030D-6E8A-4147-A177-3AD203B41FA5}">
+                      <a16:colId xmlns:a16="http://schemas.microsoft.com/office/drawing/2014/main" val="20003"/>
+                    </a:ext>
+                  </a:extLst>
+                </a:gridCol>
+                <a:gridCol w="859536">
+                  <a:extLst>
+                    <a:ext uri="{9D8B030D-6E8A-4147-A177-3AD203B41FA5}">
+                      <a16:colId xmlns:a16="http://schemas.microsoft.com/office/drawing/2014/main" val="20004"/>
+                    </a:ext>
+                  </a:extLst>
+                </a:gridCol>
               </a:tblGrid>
               <a:tr h="335280">
                 <a:tc>
@@ -4362,75 +4600,80 @@
                     <a:lstStyle/>
                     <a:p>
                       <a:pPr>
-                        <a:defRPr b="1" sz="1000"/>
-                      </a:pPr>
-                      <a:r>
-                        <a:t>phase</a:t>
-                      </a:r>
-                    </a:p>
-                  </a:txBody>
-                  <a:tcPr/>
-                </a:tc>
-                <a:tc>
-                  <a:txBody>
-                    <a:bodyPr/>
-                    <a:lstStyle/>
-                    <a:p>
-                      <a:pPr>
-                        <a:defRPr b="1" sz="1000"/>
-                      </a:pPr>
-                      <a:r>
-                        <a:t>intensity</a:t>
-                      </a:r>
-                    </a:p>
-                  </a:txBody>
-                  <a:tcPr/>
-                </a:tc>
-                <a:tc>
-                  <a:txBody>
-                    <a:bodyPr/>
-                    <a:lstStyle/>
-                    <a:p>
-                      <a:pPr>
-                        <a:defRPr b="1" sz="1000"/>
-                      </a:pPr>
-                      <a:r>
-                        <a:t>duration_min</a:t>
-                      </a:r>
-                    </a:p>
-                  </a:txBody>
-                  <a:tcPr/>
-                </a:tc>
-                <a:tc>
-                  <a:txBody>
-                    <a:bodyPr/>
-                    <a:lstStyle/>
-                    <a:p>
-                      <a:pPr>
-                        <a:defRPr b="1" sz="1000"/>
-                      </a:pPr>
-                      <a:r>
-                        <a:t>distance_yd</a:t>
-                      </a:r>
-                    </a:p>
-                  </a:txBody>
-                  <a:tcPr/>
-                </a:tc>
-                <a:tc>
-                  <a:txBody>
-                    <a:bodyPr/>
-                    <a:lstStyle/>
-                    <a:p>
-                      <a:pPr>
-                        <a:defRPr b="1" sz="1000"/>
-                      </a:pPr>
-                      <a:r>
-                        <a:t>max_speed_mph</a:t>
-                      </a:r>
-                    </a:p>
-                  </a:txBody>
-                  <a:tcPr/>
-                </a:tc>
+                        <a:defRPr sz="1000" b="1"/>
+                      </a:pPr>
+                      <a:r>
+                        <a:t>#</a:t>
+                      </a:r>
+                    </a:p>
+                  </a:txBody>
+                  <a:tcPr/>
+                </a:tc>
+                <a:tc>
+                  <a:txBody>
+                    <a:bodyPr/>
+                    <a:lstStyle/>
+                    <a:p>
+                      <a:pPr>
+                        <a:defRPr sz="1000" b="1"/>
+                      </a:pPr>
+                      <a:r>
+                        <a:t>Intensity</a:t>
+                      </a:r>
+                    </a:p>
+                  </a:txBody>
+                  <a:tcPr/>
+                </a:tc>
+                <a:tc>
+                  <a:txBody>
+                    <a:bodyPr/>
+                    <a:lstStyle/>
+                    <a:p>
+                      <a:pPr>
+                        <a:defRPr sz="1000" b="1"/>
+                      </a:pPr>
+                      <a:r>
+                        <a:t>Time (min)</a:t>
+                      </a:r>
+                    </a:p>
+                  </a:txBody>
+                  <a:tcPr/>
+                </a:tc>
+                <a:tc>
+                  <a:txBody>
+                    <a:bodyPr/>
+                    <a:lstStyle/>
+                    <a:p>
+                      <a:pPr>
+                        <a:defRPr sz="1000" b="1"/>
+                      </a:pPr>
+                      <a:r>
+                        <a:t>Distance</a:t>
+                      </a:r>
+                    </a:p>
+                  </a:txBody>
+                  <a:tcPr/>
+                </a:tc>
+                <a:tc>
+                  <a:txBody>
+                    <a:bodyPr/>
+                    <a:lstStyle/>
+                    <a:p>
+                      <a:pPr>
+                        <a:defRPr sz="1000" b="1"/>
+                      </a:pPr>
+                      <a:r>
+                        <a:t>Max Speed</a:t>
+                      </a:r>
+                    </a:p>
+                  </a:txBody>
+                  <a:tcPr/>
+                </a:tc>
+                <a:extLst>
+                  <a:ext uri="{0D108BD9-81ED-4DB2-BD59-A6C34878D82A}">
+                    <a16:rowId xmlns:a16="http://schemas.microsoft.com/office/drawing/2014/main" val="10000"/>
+                  </a:ext>
+                </a:extLst>
               </a:tr>
               <a:tr h="335280">
                 <a:tc>
@@ -4508,6 +4751,11 @@
                   </a:txBody>
                   <a:tcPr/>
                 </a:tc>
+                <a:extLst>
+                  <a:ext uri="{0D108BD9-81ED-4DB2-BD59-A6C34878D82A}">
+                    <a16:rowId xmlns:a16="http://schemas.microsoft.com/office/drawing/2014/main" val="10001"/>
+                  </a:ext>
+                </a:extLst>
               </a:tr>
               <a:tr h="335280">
                 <a:tc>
@@ -4585,6 +4833,11 @@
                   </a:txBody>
                   <a:tcPr/>
                 </a:tc>
+                <a:extLst>
+                  <a:ext uri="{0D108BD9-81ED-4DB2-BD59-A6C34878D82A}">
+                    <a16:rowId xmlns:a16="http://schemas.microsoft.com/office/drawing/2014/main" val="10002"/>
+                  </a:ext>
+                </a:extLst>
               </a:tr>
               <a:tr h="335280">
                 <a:tc>
@@ -4662,6 +4915,11 @@
                   </a:txBody>
                   <a:tcPr/>
                 </a:tc>
+                <a:extLst>
+                  <a:ext uri="{0D108BD9-81ED-4DB2-BD59-A6C34878D82A}">
+                    <a16:rowId xmlns:a16="http://schemas.microsoft.com/office/drawing/2014/main" val="10003"/>
+                  </a:ext>
+                </a:extLst>
               </a:tr>
               <a:tr h="335280">
                 <a:tc>
@@ -4739,6 +4997,11 @@
                   </a:txBody>
                   <a:tcPr/>
                 </a:tc>
+                <a:extLst>
+                  <a:ext uri="{0D108BD9-81ED-4DB2-BD59-A6C34878D82A}">
+                    <a16:rowId xmlns:a16="http://schemas.microsoft.com/office/drawing/2014/main" val="10004"/>
+                  </a:ext>
+                </a:extLst>
               </a:tr>
               <a:tr h="335280">
                 <a:tc>
@@ -4816,6 +5079,11 @@
                   </a:txBody>
                   <a:tcPr/>
                 </a:tc>
+                <a:extLst>
+                  <a:ext uri="{0D108BD9-81ED-4DB2-BD59-A6C34878D82A}">
+                    <a16:rowId xmlns:a16="http://schemas.microsoft.com/office/drawing/2014/main" val="10005"/>
+                  </a:ext>
+                </a:extLst>
               </a:tr>
             </a:tbl>
           </a:graphicData>
@@ -4830,8 +5098,8 @@
           <p:nvPr/>
         </p:nvGraphicFramePr>
         <p:xfrm>
-          <a:off x="1371600" y="3474720"/>
-          <a:ext cx="6400800" cy="1645920"/>
+          <a:off x="457200" y="3291840"/>
+          <a:ext cx="8229600" cy="1828800"/>
         </p:xfrm>
         <a:graphic>
           <a:graphicData uri="http://schemas.openxmlformats.org/drawingml/2006/table">
@@ -4840,218 +5108,301 @@
                 <a:tableStyleId>{5C22544A-7EE6-4342-B048-85BDC9FD1C3A}</a:tableStyleId>
               </a:tblPr>
               <a:tblGrid>
-                <a:gridCol w="492369"/>
-                <a:gridCol w="492369"/>
-                <a:gridCol w="492369"/>
-                <a:gridCol w="492369"/>
-                <a:gridCol w="492369"/>
-                <a:gridCol w="492369"/>
-                <a:gridCol w="492369"/>
-                <a:gridCol w="492369"/>
-                <a:gridCol w="492369"/>
-                <a:gridCol w="492369"/>
-                <a:gridCol w="492369"/>
-                <a:gridCol w="492369"/>
-                <a:gridCol w="492372"/>
+                <a:gridCol w="633046">
+                  <a:extLst>
+                    <a:ext uri="{9D8B030D-6E8A-4147-A177-3AD203B41FA5}">
+                      <a16:colId xmlns:a16="http://schemas.microsoft.com/office/drawing/2014/main" val="20000"/>
+                    </a:ext>
+                  </a:extLst>
+                </a:gridCol>
+                <a:gridCol w="633046">
+                  <a:extLst>
+                    <a:ext uri="{9D8B030D-6E8A-4147-A177-3AD203B41FA5}">
+                      <a16:colId xmlns:a16="http://schemas.microsoft.com/office/drawing/2014/main" val="20001"/>
+                    </a:ext>
+                  </a:extLst>
+                </a:gridCol>
+                <a:gridCol w="633046">
+                  <a:extLst>
+                    <a:ext uri="{9D8B030D-6E8A-4147-A177-3AD203B41FA5}">
+                      <a16:colId xmlns:a16="http://schemas.microsoft.com/office/drawing/2014/main" val="20002"/>
+                    </a:ext>
+                  </a:extLst>
+                </a:gridCol>
+                <a:gridCol w="633046">
+                  <a:extLst>
+                    <a:ext uri="{9D8B030D-6E8A-4147-A177-3AD203B41FA5}">
+                      <a16:colId xmlns:a16="http://schemas.microsoft.com/office/drawing/2014/main" val="20003"/>
+                    </a:ext>
+                  </a:extLst>
+                </a:gridCol>
+                <a:gridCol w="633046">
+                  <a:extLst>
+                    <a:ext uri="{9D8B030D-6E8A-4147-A177-3AD203B41FA5}">
+                      <a16:colId xmlns:a16="http://schemas.microsoft.com/office/drawing/2014/main" val="20004"/>
+                    </a:ext>
+                  </a:extLst>
+                </a:gridCol>
+                <a:gridCol w="633046">
+                  <a:extLst>
+                    <a:ext uri="{9D8B030D-6E8A-4147-A177-3AD203B41FA5}">
+                      <a16:colId xmlns:a16="http://schemas.microsoft.com/office/drawing/2014/main" val="20005"/>
+                    </a:ext>
+                  </a:extLst>
+                </a:gridCol>
+                <a:gridCol w="633046">
+                  <a:extLst>
+                    <a:ext uri="{9D8B030D-6E8A-4147-A177-3AD203B41FA5}">
+                      <a16:colId xmlns:a16="http://schemas.microsoft.com/office/drawing/2014/main" val="20006"/>
+                    </a:ext>
+                  </a:extLst>
+                </a:gridCol>
+                <a:gridCol w="633046">
+                  <a:extLst>
+                    <a:ext uri="{9D8B030D-6E8A-4147-A177-3AD203B41FA5}">
+                      <a16:colId xmlns:a16="http://schemas.microsoft.com/office/drawing/2014/main" val="20007"/>
+                    </a:ext>
+                  </a:extLst>
+                </a:gridCol>
+                <a:gridCol w="633046">
+                  <a:extLst>
+                    <a:ext uri="{9D8B030D-6E8A-4147-A177-3AD203B41FA5}">
+                      <a16:colId xmlns:a16="http://schemas.microsoft.com/office/drawing/2014/main" val="20008"/>
+                    </a:ext>
+                  </a:extLst>
+                </a:gridCol>
+                <a:gridCol w="633046">
+                  <a:extLst>
+                    <a:ext uri="{9D8B030D-6E8A-4147-A177-3AD203B41FA5}">
+                      <a16:colId xmlns:a16="http://schemas.microsoft.com/office/drawing/2014/main" val="20009"/>
+                    </a:ext>
+                  </a:extLst>
+                </a:gridCol>
+                <a:gridCol w="633046">
+                  <a:extLst>
+                    <a:ext uri="{9D8B030D-6E8A-4147-A177-3AD203B41FA5}">
+                      <a16:colId xmlns:a16="http://schemas.microsoft.com/office/drawing/2014/main" val="20010"/>
+                    </a:ext>
+                  </a:extLst>
+                </a:gridCol>
+                <a:gridCol w="633046">
+                  <a:extLst>
+                    <a:ext uri="{9D8B030D-6E8A-4147-A177-3AD203B41FA5}">
+                      <a16:colId xmlns:a16="http://schemas.microsoft.com/office/drawing/2014/main" val="20011"/>
+                    </a:ext>
+                  </a:extLst>
+                </a:gridCol>
+                <a:gridCol w="633048">
+                  <a:extLst>
+                    <a:ext uri="{9D8B030D-6E8A-4147-A177-3AD203B41FA5}">
+                      <a16:colId xmlns:a16="http://schemas.microsoft.com/office/drawing/2014/main" val="20012"/>
+                    </a:ext>
+                  </a:extLst>
+                </a:gridCol>
               </a:tblGrid>
-              <a:tr h="548640">
-                <a:tc>
-                  <a:txBody>
-                    <a:bodyPr/>
-                    <a:lstStyle/>
-                    <a:p>
-                      <a:pPr>
-                        <a:defRPr b="1" sz="1000"/>
-                      </a:pPr>
-                      <a:r>
-                        <a:t>period</a:t>
-                      </a:r>
-                    </a:p>
-                  </a:txBody>
-                  <a:tcPr/>
-                </a:tc>
-                <a:tc>
-                  <a:txBody>
-                    <a:bodyPr/>
-                    <a:lstStyle/>
-                    <a:p>
-                      <a:pPr>
-                        <a:defRPr b="1" sz="1000"/>
-                      </a:pPr>
-                      <a:r>
-                        <a:t>duration_min</a:t>
-                      </a:r>
-                    </a:p>
-                  </a:txBody>
-                  <a:tcPr/>
-                </a:tc>
-                <a:tc>
-                  <a:txBody>
-                    <a:bodyPr/>
-                    <a:lstStyle/>
-                    <a:p>
-                      <a:pPr>
-                        <a:defRPr b="1" sz="1000"/>
-                      </a:pPr>
-                      <a:r>
-                        <a:t>distance_yd</a:t>
-                      </a:r>
-                    </a:p>
-                  </a:txBody>
-                  <a:tcPr/>
-                </a:tc>
-                <a:tc>
-                  <a:txBody>
-                    <a:bodyPr/>
-                    <a:lstStyle/>
-                    <a:p>
-                      <a:pPr>
-                        <a:defRPr b="1" sz="1000"/>
-                      </a:pPr>
-                      <a:r>
-                        <a:t>distance_rate_yd_min</a:t>
-                      </a:r>
-                    </a:p>
-                  </a:txBody>
-                  <a:tcPr/>
-                </a:tc>
-                <a:tc>
-                  <a:txBody>
-                    <a:bodyPr/>
-                    <a:lstStyle/>
-                    <a:p>
-                      <a:pPr>
-                        <a:defRPr b="1" sz="1000"/>
-                      </a:pPr>
-                      <a:r>
-                        <a:t>mean_speed_mph</a:t>
-                      </a:r>
-                    </a:p>
-                  </a:txBody>
-                  <a:tcPr/>
-                </a:tc>
-                <a:tc>
-                  <a:txBody>
-                    <a:bodyPr/>
-                    <a:lstStyle/>
-                    <a:p>
-                      <a:pPr>
-                        <a:defRPr b="1" sz="1000"/>
-                      </a:pPr>
-                      <a:r>
-                        <a:t>max_speed_mph</a:t>
-                      </a:r>
-                    </a:p>
-                  </a:txBody>
-                  <a:tcPr/>
-                </a:tc>
-                <a:tc>
-                  <a:txBody>
-                    <a:bodyPr/>
-                    <a:lstStyle/>
-                    <a:p>
-                      <a:pPr>
-                        <a:defRPr b="1" sz="1000"/>
-                      </a:pPr>
-                      <a:r>
-                        <a:t>hsr_distance_yd</a:t>
-                      </a:r>
-                    </a:p>
-                  </a:txBody>
-                  <a:tcPr/>
-                </a:tc>
-                <a:tc>
-                  <a:txBody>
-                    <a:bodyPr/>
-                    <a:lstStyle/>
-                    <a:p>
-                      <a:pPr>
-                        <a:defRPr b="1" sz="1000"/>
-                      </a:pPr>
-                      <a:r>
-                        <a:t>sprint_distance_yd</a:t>
-                      </a:r>
-                    </a:p>
-                  </a:txBody>
-                  <a:tcPr/>
-                </a:tc>
-                <a:tc>
-                  <a:txBody>
-                    <a:bodyPr/>
-                    <a:lstStyle/>
-                    <a:p>
-                      <a:pPr>
-                        <a:defRPr b="1" sz="1000"/>
-                      </a:pPr>
-                      <a:r>
-                        <a:t>hsr_events</a:t>
-                      </a:r>
-                    </a:p>
-                  </a:txBody>
-                  <a:tcPr/>
-                </a:tc>
-                <a:tc>
-                  <a:txBody>
-                    <a:bodyPr/>
-                    <a:lstStyle/>
-                    <a:p>
-                      <a:pPr>
-                        <a:defRPr b="1" sz="1000"/>
-                      </a:pPr>
-                      <a:r>
-                        <a:t>sprint_events</a:t>
-                      </a:r>
-                    </a:p>
-                  </a:txBody>
-                  <a:tcPr/>
-                </a:tc>
-                <a:tc>
-                  <a:txBody>
-                    <a:bodyPr/>
-                    <a:lstStyle/>
-                    <a:p>
-                      <a:pPr>
-                        <a:defRPr b="1" sz="1000"/>
-                      </a:pPr>
-                      <a:r>
-                        <a:t>accel_events</a:t>
-                      </a:r>
-                    </a:p>
-                  </a:txBody>
-                  <a:tcPr/>
-                </a:tc>
-                <a:tc>
-                  <a:txBody>
-                    <a:bodyPr/>
-                    <a:lstStyle/>
-                    <a:p>
-                      <a:pPr>
-                        <a:defRPr b="1" sz="1000"/>
-                      </a:pPr>
-                      <a:r>
-                        <a:t>decel_events</a:t>
-                      </a:r>
-                    </a:p>
-                  </a:txBody>
-                  <a:tcPr/>
-                </a:tc>
-                <a:tc>
-                  <a:txBody>
-                    <a:bodyPr/>
-                    <a:lstStyle/>
-                    <a:p>
-                      <a:pPr>
-                        <a:defRPr b="1" sz="1000"/>
-                      </a:pPr>
-                      <a:r>
-                        <a:t>delta_%</a:t>
-                      </a:r>
-                    </a:p>
-                  </a:txBody>
-                  <a:tcPr/>
-                </a:tc>
+              <a:tr h="609600">
+                <a:tc>
+                  <a:txBody>
+                    <a:bodyPr/>
+                    <a:lstStyle/>
+                    <a:p>
+                      <a:pPr>
+                        <a:defRPr sz="1000" b="1"/>
+                      </a:pPr>
+                      <a:r>
+                        <a:t>Period</a:t>
+                      </a:r>
+                    </a:p>
+                  </a:txBody>
+                  <a:tcPr/>
+                </a:tc>
+                <a:tc>
+                  <a:txBody>
+                    <a:bodyPr/>
+                    <a:lstStyle/>
+                    <a:p>
+                      <a:pPr>
+                        <a:defRPr sz="1000" b="1"/>
+                      </a:pPr>
+                      <a:r>
+                        <a:t>Time (min)</a:t>
+                      </a:r>
+                    </a:p>
+                  </a:txBody>
+                  <a:tcPr/>
+                </a:tc>
+                <a:tc>
+                  <a:txBody>
+                    <a:bodyPr/>
+                    <a:lstStyle/>
+                    <a:p>
+                      <a:pPr>
+                        <a:defRPr sz="1000" b="1"/>
+                      </a:pPr>
+                      <a:r>
+                        <a:t>Distance (yd)</a:t>
+                      </a:r>
+                    </a:p>
+                  </a:txBody>
+                  <a:tcPr/>
+                </a:tc>
+                <a:tc>
+                  <a:txBody>
+                    <a:bodyPr/>
+                    <a:lstStyle/>
+                    <a:p>
+                      <a:pPr>
+                        <a:defRPr sz="1000" b="1"/>
+                      </a:pPr>
+                      <a:r>
+                        <a:t>Rate (yd/min)</a:t>
+                      </a:r>
+                    </a:p>
+                  </a:txBody>
+                  <a:tcPr/>
+                </a:tc>
+                <a:tc>
+                  <a:txBody>
+                    <a:bodyPr/>
+                    <a:lstStyle/>
+                    <a:p>
+                      <a:pPr>
+                        <a:defRPr sz="1000" b="1"/>
+                      </a:pPr>
+                      <a:r>
+                        <a:t>Avg Speed</a:t>
+                      </a:r>
+                    </a:p>
+                  </a:txBody>
+                  <a:tcPr/>
+                </a:tc>
+                <a:tc>
+                  <a:txBody>
+                    <a:bodyPr/>
+                    <a:lstStyle/>
+                    <a:p>
+                      <a:pPr>
+                        <a:defRPr sz="1000" b="1"/>
+                      </a:pPr>
+                      <a:r>
+                        <a:t>Max Speed</a:t>
+                      </a:r>
+                    </a:p>
+                  </a:txBody>
+                  <a:tcPr/>
+                </a:tc>
+                <a:tc>
+                  <a:txBody>
+                    <a:bodyPr/>
+                    <a:lstStyle/>
+                    <a:p>
+                      <a:pPr>
+                        <a:defRPr sz="1000" b="1"/>
+                      </a:pPr>
+                      <a:r>
+                        <a:t>HSR Dist</a:t>
+                      </a:r>
+                    </a:p>
+                  </a:txBody>
+                  <a:tcPr/>
+                </a:tc>
+                <a:tc>
+                  <a:txBody>
+                    <a:bodyPr/>
+                    <a:lstStyle/>
+                    <a:p>
+                      <a:pPr>
+                        <a:defRPr sz="1000" b="1"/>
+                      </a:pPr>
+                      <a:r>
+                        <a:t>Sprint Dist</a:t>
+                      </a:r>
+                    </a:p>
+                  </a:txBody>
+                  <a:tcPr/>
+                </a:tc>
+                <a:tc>
+                  <a:txBody>
+                    <a:bodyPr/>
+                    <a:lstStyle/>
+                    <a:p>
+                      <a:pPr>
+                        <a:defRPr sz="1000" b="1"/>
+                      </a:pPr>
+                      <a:r>
+                        <a:t>HSR #</a:t>
+                      </a:r>
+                    </a:p>
+                  </a:txBody>
+                  <a:tcPr/>
+                </a:tc>
+                <a:tc>
+                  <a:txBody>
+                    <a:bodyPr/>
+                    <a:lstStyle/>
+                    <a:p>
+                      <a:pPr>
+                        <a:defRPr sz="1000" b="1"/>
+                      </a:pPr>
+                      <a:r>
+                        <a:t>Sprint #</a:t>
+                      </a:r>
+                    </a:p>
+                  </a:txBody>
+                  <a:tcPr/>
+                </a:tc>
+                <a:tc>
+                  <a:txBody>
+                    <a:bodyPr/>
+                    <a:lstStyle/>
+                    <a:p>
+                      <a:pPr>
+                        <a:defRPr sz="1000" b="1"/>
+                      </a:pPr>
+                      <a:r>
+                        <a:t>Accel #</a:t>
+                      </a:r>
+                    </a:p>
+                  </a:txBody>
+                  <a:tcPr/>
+                </a:tc>
+                <a:tc>
+                  <a:txBody>
+                    <a:bodyPr/>
+                    <a:lstStyle/>
+                    <a:p>
+                      <a:pPr>
+                        <a:defRPr sz="1000" b="1"/>
+                      </a:pPr>
+                      <a:r>
+                        <a:t>Decel #</a:t>
+                      </a:r>
+                    </a:p>
+                  </a:txBody>
+                  <a:tcPr/>
+                </a:tc>
+                <a:tc>
+                  <a:txBody>
+                    <a:bodyPr/>
+                    <a:lstStyle/>
+                    <a:p>
+                      <a:pPr>
+                        <a:defRPr sz="1000" b="1"/>
+                      </a:pPr>
+                      <a:r>
+                        <a:t>Change</a:t>
+                      </a:r>
+                    </a:p>
+                  </a:txBody>
+                  <a:tcPr/>
+                </a:tc>
+                <a:extLst>
+                  <a:ext uri="{0D108BD9-81ED-4DB2-BD59-A6C34878D82A}">
+                    <a16:rowId xmlns:a16="http://schemas.microsoft.com/office/drawing/2014/main" val="10000"/>
+                  </a:ext>
+                </a:extLst>
               </a:tr>
-              <a:tr h="548640">
+              <a:tr h="609600">
                 <a:tc>
                   <a:txBody>
                     <a:bodyPr/>
@@ -5241,14 +5592,19 @@
                         <a:defRPr sz="900"/>
                       </a:pPr>
                       <a:r>
-                        <a:t>baseline</a:t>
-                      </a:r>
-                    </a:p>
-                  </a:txBody>
-                  <a:tcPr/>
-                </a:tc>
+                        <a:t>—</a:t>
+                      </a:r>
+                    </a:p>
+                  </a:txBody>
+                  <a:tcPr/>
+                </a:tc>
+                <a:extLst>
+                  <a:ext uri="{0D108BD9-81ED-4DB2-BD59-A6C34878D82A}">
+                    <a16:rowId xmlns:a16="http://schemas.microsoft.com/office/drawing/2014/main" val="10001"/>
+                  </a:ext>
+                </a:extLst>
               </a:tr>
-              <a:tr h="548640">
+              <a:tr h="609600">
                 <a:tc>
                   <a:txBody>
                     <a:bodyPr/>
@@ -5444,6 +5800,11 @@
                   </a:txBody>
                   <a:tcPr/>
                 </a:tc>
+                <a:extLst>
+                  <a:ext uri="{0D108BD9-81ED-4DB2-BD59-A6C34878D82A}">
+                    <a16:rowId xmlns:a16="http://schemas.microsoft.com/office/drawing/2014/main" val="10002"/>
+                  </a:ext>
+                </a:extLst>
               </a:tr>
             </a:tbl>
           </a:graphicData>
@@ -5457,8 +5818,8 @@
         </p:nvSpPr>
         <p:spPr>
           <a:xfrm>
-            <a:off x="914400" y="5303520"/>
-            <a:ext cx="7315200" cy="457200"/>
+            <a:off x="457200" y="5303520"/>
+            <a:ext cx="8229600" cy="548640"/>
           </a:xfrm>
           <a:prstGeom prst="rect">
             <a:avLst/>
@@ -5475,7 +5836,7 @@
               <a:defRPr sz="1600" b="1"/>
             </a:pPr>
             <a:r>
-              <a:t>Late-session output: +7.3% vs early half</a:t>
+              <a:t>Second half output was 7.3% HIGHER - excellent conditioning!</a:t>
             </a:r>
           </a:p>
         </p:txBody>
@@ -5489,7 +5850,7 @@
 </file>
 
 <file path=ppt/slides/slide7.xml><?xml version="1.0" encoding="utf-8"?>
-<p:sld xmlns:a="http://schemas.openxmlformats.org/drawingml/2006/main" xmlns:p="http://schemas.openxmlformats.org/presentationml/2006/main" xmlns:r="http://schemas.openxmlformats.org/officeDocument/2006/relationships">
+<p:sld xmlns:a="http://schemas.openxmlformats.org/drawingml/2006/main" xmlns:r="http://schemas.openxmlformats.org/officeDocument/2006/relationships" xmlns:p="http://schemas.openxmlformats.org/presentationml/2006/main">
   <p:cSld>
     <p:spTree>
       <p:nvGrpSpPr>
@@ -5497,24 +5858,14 @@
         <p:cNvGrpSpPr/>
         <p:nvPr/>
       </p:nvGrpSpPr>
-      <p:grpSpPr/>
-      <p:sp>
-        <p:nvSpPr>
-          <p:cNvPr id="2" name="Title 1"/>
-          <p:cNvSpPr>
-            <a:spLocks noGrp="1"/>
-          </p:cNvSpPr>
-          <p:nvPr>
-            <p:ph type="title"/>
-          </p:nvPr>
-        </p:nvSpPr>
-        <p:spPr/>
-        <p:txBody>
-          <a:bodyPr/>
-          <a:lstStyle/>
-          <a:p/>
-        </p:txBody>
-      </p:sp>
+      <p:grpSpPr>
+        <a:xfrm>
+          <a:off x="0" y="0"/>
+          <a:ext cx="0" cy="0"/>
+          <a:chOff x="0" y="0"/>
+          <a:chExt cx="0" cy="0"/>
+        </a:xfrm>
+      </p:grpSpPr>
       <p:sp>
         <p:nvSpPr>
           <p:cNvPr id="3" name="TextBox 2"/>
@@ -5555,7 +5906,7 @@
         <p:spPr>
           <a:xfrm>
             <a:off x="640080" y="1097280"/>
-            <a:ext cx="7863840" cy="5303520"/>
+            <a:ext cx="7863840" cy="5078313"/>
           </a:xfrm>
           <a:prstGeom prst="rect">
             <a:avLst/>
@@ -5572,101 +5923,172 @@
               <a:defRPr sz="1200" b="0"/>
             </a:pPr>
             <a:r>
-              <a:t>QC Status: QC PASS</a:t>
-            </a:r>
-            <a:br/>
-            <a:r>
-              <a:t>Speed-XY Correlation: 0.979 (PASS)</a:t>
-            </a:r>
-            <a:br/>
-            <a:br/>
-            <a:r>
+              <a:rPr dirty="0"/>
+              <a:t>Data Quality: EXCELLENT</a:t>
+            </a:r>
+            <a:br>
+              <a:rPr dirty="0"/>
+            </a:br>
+            <a:r>
+              <a:rPr dirty="0"/>
+              <a:t>GPS Accuracy: 0.979 (Highly reliable tracking - position and speed data match)</a:t>
+            </a:r>
+            <a:br>
+              <a:rPr dirty="0"/>
+            </a:br>
+            <a:br>
+              <a:rPr dirty="0"/>
+            </a:br>
+            <a:r>
+              <a:rPr dirty="0"/>
               <a:t>Session Summary:</a:t>
             </a:r>
-            <a:br/>
-            <a:r>
+            <a:br>
+              <a:rPr dirty="0"/>
+            </a:br>
+            <a:r>
+              <a:rPr dirty="0"/>
               <a:t>• Total Distance: 4840 yards over 112.2 minutes</a:t>
             </a:r>
-            <a:br/>
-            <a:r>
+            <a:br>
+              <a:rPr dirty="0"/>
+            </a:br>
+            <a:r>
+              <a:rPr dirty="0"/>
               <a:t>• Max Speed: 18.7 mph (skill position profile)</a:t>
             </a:r>
-            <a:br/>
-            <a:r>
+            <a:br>
+              <a:rPr dirty="0"/>
+            </a:br>
+            <a:r>
+              <a:rPr dirty="0"/>
               <a:t>• HSR Distance: 217 yd (6 events ≥1s)</a:t>
             </a:r>
-            <a:br/>
-            <a:r>
+            <a:br>
+              <a:rPr dirty="0"/>
+            </a:br>
+            <a:r>
+              <a:rPr dirty="0"/>
               <a:t>• Sprint Distance: 84 yd (4 events ≥1s)</a:t>
             </a:r>
-            <a:br/>
-            <a:br/>
-            <a:r>
+            <a:br>
+              <a:rPr dirty="0"/>
+            </a:br>
+            <a:br>
+              <a:rPr dirty="0"/>
+            </a:br>
+            <a:r>
+              <a:rPr dirty="0"/>
               <a:t>Phase Structure:</a:t>
             </a:r>
-            <a:br/>
-            <a:r>
+            <a:br>
+              <a:rPr dirty="0"/>
+            </a:br>
+            <a:r>
+              <a:rPr dirty="0"/>
               <a:t>• 21 distinct phases identified</a:t>
             </a:r>
-            <a:br/>
-            <a:r>
+            <a:br>
+              <a:rPr dirty="0"/>
+            </a:br>
+            <a:r>
+              <a:rPr dirty="0"/>
               <a:t>• High-intensity work clustered in specific drill blocks</a:t>
             </a:r>
-            <a:br/>
-            <a:r>
+            <a:br>
+              <a:rPr dirty="0"/>
+            </a:br>
+            <a:r>
+              <a:rPr dirty="0"/>
               <a:t>• Late-session output: +7.3% vs early half</a:t>
             </a:r>
-            <a:br/>
-            <a:br/>
-            <a:r>
+            <a:br>
+              <a:rPr dirty="0"/>
+            </a:br>
+            <a:br>
+              <a:rPr dirty="0"/>
+            </a:br>
+            <a:r>
+              <a:rPr dirty="0"/>
               <a:t>Peak Demands (defines conditioning targets):</a:t>
             </a:r>
-            <a:br/>
-            <a:r>
+            <a:br>
+              <a:rPr dirty="0"/>
+            </a:br>
+            <a:r>
+              <a:rPr dirty="0"/>
               <a:t>• Best 15s: 74.4 yd (298 yd/min)</a:t>
             </a:r>
-            <a:br/>
-            <a:r>
+            <a:br>
+              <a:rPr dirty="0"/>
+            </a:br>
+            <a:r>
+              <a:rPr dirty="0"/>
               <a:t>• Best 30s: 98.8 yd (198 yd/min)</a:t>
             </a:r>
-            <a:br/>
-            <a:r>
+            <a:br>
+              <a:rPr dirty="0"/>
+            </a:br>
+            <a:r>
+              <a:rPr dirty="0"/>
               <a:t>• Best 1min: 135.1 yd (135 yd/min)</a:t>
             </a:r>
-            <a:br/>
-            <a:r>
+            <a:br>
+              <a:rPr dirty="0"/>
+            </a:br>
+            <a:r>
+              <a:rPr dirty="0"/>
               <a:t>• Best 2min: 221.1 yd (111 yd/min)</a:t>
             </a:r>
-            <a:br/>
-            <a:r>
+            <a:br>
+              <a:rPr dirty="0"/>
+            </a:br>
+            <a:r>
+              <a:rPr dirty="0"/>
               <a:t>• Best 5min: 432.4 yd (86 yd/min)</a:t>
             </a:r>
-            <a:br/>
-            <a:br/>
-            <a:r>
+            <a:br>
+              <a:rPr dirty="0"/>
+            </a:br>
+            <a:br>
+              <a:rPr dirty="0"/>
+            </a:br>
+            <a:r>
+              <a:rPr dirty="0"/>
               <a:t>Recommendations:</a:t>
             </a:r>
-            <a:br/>
-            <a:r>
+            <a:br>
+              <a:rPr dirty="0"/>
+            </a:br>
+            <a:r>
+              <a:rPr dirty="0"/>
               <a:t>&gt; Use peak window values to anchor position-specific conditioning drills</a:t>
             </a:r>
-            <a:br/>
-            <a:r>
+            <a:br>
+              <a:rPr dirty="0"/>
+            </a:br>
+            <a:r>
+              <a:rPr dirty="0"/>
               <a:t>&gt; Monitor early vs late drift as a readiness signal across sessions</a:t>
             </a:r>
-            <a:br/>
-            <a:r>
+            <a:br>
+              <a:rPr dirty="0"/>
+            </a:br>
+            <a:r>
+              <a:rPr dirty="0"/>
               <a:t>&gt; Target HSR exposure in specific drill phases (not distributed evenly)</a:t>
             </a:r>
-            <a:br/>
-            <a:r>
+            <a:br>
+              <a:rPr dirty="0"/>
+            </a:br>
+            <a:r>
+              <a:rPr dirty="0"/>
               <a:t>&gt; Validate movement patterns against position/role expectations</a:t>
             </a:r>
-            <a:br/>
-            <a:br/>
-            <a:r>
-              <a:t>Generated with Claude Code</a:t>
-            </a:r>
+            <a:br>
+              <a:rPr/>
+            </a:br>
+            <a:endParaRPr dirty="0"/>
           </a:p>
         </p:txBody>
       </p:sp>

</xml_diff>